<commit_message>
Improve crawler design #2
</commit_message>
<xml_diff>
--- a/System Design and Architecture.pptx
+++ b/System Design and Architecture.pptx
@@ -21680,6 +21680,186 @@
           </a:p>
         </p:txBody>
       </p:sp>
+      <p:sp>
+        <p:nvSpPr>
+          <p:cNvPr id="74" name="תיבת טקסט 73">
+            <a:extLst>
+              <a:ext uri="{FF2B5EF4-FFF2-40B4-BE49-F238E27FC236}">
+                <a16:creationId xmlns:a16="http://schemas.microsoft.com/office/drawing/2014/main" id="{961F01B8-240C-4CE6-B8A2-EC7F4997A5CF}"/>
+              </a:ext>
+            </a:extLst>
+          </p:cNvPr>
+          <p:cNvSpPr txBox="1"/>
+          <p:nvPr/>
+        </p:nvSpPr>
+        <p:spPr>
+          <a:xfrm>
+            <a:off x="7496634" y="126112"/>
+            <a:ext cx="2107392" cy="371589"/>
+          </a:xfrm>
+          <a:custGeom>
+            <a:avLst/>
+            <a:gdLst>
+              <a:gd name="connsiteX0" fmla="*/ 0 w 2107392"/>
+              <a:gd name="connsiteY0" fmla="*/ 0 h 369332"/>
+              <a:gd name="connsiteX1" fmla="*/ 2107392 w 2107392"/>
+              <a:gd name="connsiteY1" fmla="*/ 0 h 369332"/>
+              <a:gd name="connsiteX2" fmla="*/ 2107392 w 2107392"/>
+              <a:gd name="connsiteY2" fmla="*/ 369332 h 369332"/>
+              <a:gd name="connsiteX3" fmla="*/ 0 w 2107392"/>
+              <a:gd name="connsiteY3" fmla="*/ 369332 h 369332"/>
+              <a:gd name="connsiteX4" fmla="*/ 0 w 2107392"/>
+              <a:gd name="connsiteY4" fmla="*/ 0 h 369332"/>
+              <a:gd name="connsiteX0" fmla="*/ 0 w 2107392"/>
+              <a:gd name="connsiteY0" fmla="*/ 0 h 371589"/>
+              <a:gd name="connsiteX1" fmla="*/ 2107392 w 2107392"/>
+              <a:gd name="connsiteY1" fmla="*/ 0 h 371589"/>
+              <a:gd name="connsiteX2" fmla="*/ 2107392 w 2107392"/>
+              <a:gd name="connsiteY2" fmla="*/ 369332 h 371589"/>
+              <a:gd name="connsiteX3" fmla="*/ 421931 w 2107392"/>
+              <a:gd name="connsiteY3" fmla="*/ 371589 h 371589"/>
+              <a:gd name="connsiteX4" fmla="*/ 0 w 2107392"/>
+              <a:gd name="connsiteY4" fmla="*/ 369332 h 371589"/>
+              <a:gd name="connsiteX5" fmla="*/ 0 w 2107392"/>
+              <a:gd name="connsiteY5" fmla="*/ 0 h 371589"/>
+              <a:gd name="connsiteX0" fmla="*/ 0 w 2107392"/>
+              <a:gd name="connsiteY0" fmla="*/ 0 h 444729"/>
+              <a:gd name="connsiteX1" fmla="*/ 2107392 w 2107392"/>
+              <a:gd name="connsiteY1" fmla="*/ 0 h 444729"/>
+              <a:gd name="connsiteX2" fmla="*/ 2107392 w 2107392"/>
+              <a:gd name="connsiteY2" fmla="*/ 369332 h 444729"/>
+              <a:gd name="connsiteX3" fmla="*/ 421931 w 2107392"/>
+              <a:gd name="connsiteY3" fmla="*/ 371589 h 444729"/>
+              <a:gd name="connsiteX4" fmla="*/ 0 w 2107392"/>
+              <a:gd name="connsiteY4" fmla="*/ 369332 h 444729"/>
+              <a:gd name="connsiteX5" fmla="*/ 0 w 2107392"/>
+              <a:gd name="connsiteY5" fmla="*/ 0 h 444729"/>
+              <a:gd name="connsiteX0" fmla="*/ 0 w 2107392"/>
+              <a:gd name="connsiteY0" fmla="*/ 0 h 371589"/>
+              <a:gd name="connsiteX1" fmla="*/ 2107392 w 2107392"/>
+              <a:gd name="connsiteY1" fmla="*/ 0 h 371589"/>
+              <a:gd name="connsiteX2" fmla="*/ 2107392 w 2107392"/>
+              <a:gd name="connsiteY2" fmla="*/ 369332 h 371589"/>
+              <a:gd name="connsiteX3" fmla="*/ 421931 w 2107392"/>
+              <a:gd name="connsiteY3" fmla="*/ 371589 h 371589"/>
+              <a:gd name="connsiteX4" fmla="*/ 0 w 2107392"/>
+              <a:gd name="connsiteY4" fmla="*/ 369332 h 371589"/>
+              <a:gd name="connsiteX5" fmla="*/ 0 w 2107392"/>
+              <a:gd name="connsiteY5" fmla="*/ 0 h 371589"/>
+            </a:gdLst>
+            <a:ahLst/>
+            <a:cxnLst>
+              <a:cxn ang="0">
+                <a:pos x="connsiteX0" y="connsiteY0"/>
+              </a:cxn>
+              <a:cxn ang="0">
+                <a:pos x="connsiteX1" y="connsiteY1"/>
+              </a:cxn>
+              <a:cxn ang="0">
+                <a:pos x="connsiteX2" y="connsiteY2"/>
+              </a:cxn>
+              <a:cxn ang="0">
+                <a:pos x="connsiteX3" y="connsiteY3"/>
+              </a:cxn>
+              <a:cxn ang="0">
+                <a:pos x="connsiteX4" y="connsiteY4"/>
+              </a:cxn>
+              <a:cxn ang="0">
+                <a:pos x="connsiteX5" y="connsiteY5"/>
+              </a:cxn>
+            </a:cxnLst>
+            <a:rect l="l" t="t" r="r" b="b"/>
+            <a:pathLst>
+              <a:path w="2107392" h="371589">
+                <a:moveTo>
+                  <a:pt x="0" y="0"/>
+                </a:moveTo>
+                <a:lnTo>
+                  <a:pt x="2107392" y="0"/>
+                </a:lnTo>
+                <a:lnTo>
+                  <a:pt x="2107392" y="369332"/>
+                </a:lnTo>
+                <a:lnTo>
+                  <a:pt x="421931" y="371589"/>
+                </a:lnTo>
+                <a:lnTo>
+                  <a:pt x="0" y="369332"/>
+                </a:lnTo>
+                <a:lnTo>
+                  <a:pt x="0" y="0"/>
+                </a:lnTo>
+                <a:close/>
+              </a:path>
+            </a:pathLst>
+          </a:custGeom>
+          <a:noFill/>
+        </p:spPr>
+        <p:txBody>
+          <a:bodyPr wrap="square" rtlCol="1">
+            <a:spAutoFit/>
+          </a:bodyPr>
+          <a:lstStyle/>
+          <a:p>
+            <a:pPr algn="l" rtl="0"/>
+            <a:r>
+              <a:rPr lang="en-IL" sz="900" dirty="0"/>
+              <a:t>We can store the content as a file under </a:t>
+            </a:r>
+            <a:br>
+              <a:rPr lang="en-IL" sz="900" dirty="0"/>
+            </a:br>
+            <a:r>
+              <a:rPr lang="en-IL" sz="900" dirty="0"/>
+              <a:t>Hadoop cluster (HDFS)</a:t>
+            </a:r>
+            <a:endParaRPr lang="he-IL" sz="900" dirty="0"/>
+          </a:p>
+        </p:txBody>
+      </p:sp>
+      <p:cxnSp>
+        <p:nvCxnSpPr>
+          <p:cNvPr id="3" name="מחבר חץ ישר 2">
+            <a:extLst>
+              <a:ext uri="{FF2B5EF4-FFF2-40B4-BE49-F238E27FC236}">
+                <a16:creationId xmlns:a16="http://schemas.microsoft.com/office/drawing/2014/main" id="{F61DA9E9-612A-488D-BDCA-AEF12B12FBDC}"/>
+              </a:ext>
+            </a:extLst>
+          </p:cNvPr>
+          <p:cNvCxnSpPr>
+            <a:cxnSpLocks/>
+            <a:stCxn id="74" idx="3"/>
+            <a:endCxn id="14" idx="0"/>
+          </p:cNvCxnSpPr>
+          <p:nvPr/>
+        </p:nvCxnSpPr>
+        <p:spPr>
+          <a:xfrm flipH="1">
+            <a:off x="7729670" y="497701"/>
+            <a:ext cx="188895" cy="227345"/>
+          </a:xfrm>
+          <a:prstGeom prst="straightConnector1">
+            <a:avLst/>
+          </a:prstGeom>
+          <a:ln>
+            <a:tailEnd type="triangle"/>
+          </a:ln>
+        </p:spPr>
+        <p:style>
+          <a:lnRef idx="1">
+            <a:schemeClr val="dk1"/>
+          </a:lnRef>
+          <a:fillRef idx="0">
+            <a:schemeClr val="dk1"/>
+          </a:fillRef>
+          <a:effectRef idx="0">
+            <a:schemeClr val="dk1"/>
+          </a:effectRef>
+          <a:fontRef idx="minor">
+            <a:schemeClr val="tx1"/>
+          </a:fontRef>
+        </p:style>
+      </p:cxnSp>
     </p:spTree>
     <p:extLst>
       <p:ext uri="{BB962C8B-B14F-4D97-AF65-F5344CB8AC3E}">

</xml_diff>

<commit_message>
Adding ETL and Price Quote Change Designs
</commit_message>
<xml_diff>
--- a/System Design and Architecture.pptx
+++ b/System Design and Architecture.pptx
@@ -4,6 +4,9 @@
   <p:sldMasterIdLst>
     <p:sldMasterId id="2147483648" r:id="rId1"/>
   </p:sldMasterIdLst>
+  <p:notesMasterIdLst>
+    <p:notesMasterId r:id="rId12"/>
+  </p:notesMasterIdLst>
   <p:sldIdLst>
     <p:sldId id="261" r:id="rId2"/>
     <p:sldId id="256" r:id="rId3"/>
@@ -11,6 +14,10 @@
     <p:sldId id="258" r:id="rId5"/>
     <p:sldId id="259" r:id="rId6"/>
     <p:sldId id="260" r:id="rId7"/>
+    <p:sldId id="262" r:id="rId8"/>
+    <p:sldId id="263" r:id="rId9"/>
+    <p:sldId id="264" r:id="rId10"/>
+    <p:sldId id="265" r:id="rId11"/>
   </p:sldIdLst>
   <p:sldSz cx="12192000" cy="6858000"/>
   <p:notesSz cx="6858000" cy="9144000"/>
@@ -117,6 +124,381 @@
 </p:presentation>
 </file>
 
+<file path=ppt/commentAuthors.xml><?xml version="1.0" encoding="utf-8"?>
+<p:cmAuthorLst xmlns:a="http://schemas.openxmlformats.org/drawingml/2006/main" xmlns:r="http://schemas.openxmlformats.org/officeDocument/2006/relationships" xmlns:p="http://schemas.openxmlformats.org/presentationml/2006/main">
+  <p:cmAuthor id="1" name="Idan Argaman" initials="IA" lastIdx="1" clrIdx="0">
+    <p:extLst>
+      <p:ext uri="{19B8F6BF-5375-455C-9EA6-DF929625EA0E}">
+        <p15:presenceInfo xmlns:p15="http://schemas.microsoft.com/office/powerpoint/2012/main" userId="cbbbd17768f37da3" providerId="Windows Live"/>
+      </p:ext>
+    </p:extLst>
+  </p:cmAuthor>
+</p:cmAuthorLst>
+</file>
+
+<file path=ppt/comments/comment1.xml><?xml version="1.0" encoding="utf-8"?>
+<p:cmLst xmlns:a="http://schemas.openxmlformats.org/drawingml/2006/main" xmlns:r="http://schemas.openxmlformats.org/officeDocument/2006/relationships" xmlns:p="http://schemas.openxmlformats.org/presentationml/2006/main">
+  <p:cm authorId="1" dt="2024-03-26T09:52:00.285" idx="1">
+    <p:pos x="4037" y="2974"/>
+    <p:text/>
+    <p:extLst>
+      <p:ext uri="{C676402C-5697-4E1C-873F-D02D1690AC5C}">
+        <p15:threadingInfo xmlns:p15="http://schemas.microsoft.com/office/powerpoint/2012/main" timeZoneBias="-120"/>
+      </p:ext>
+    </p:extLst>
+  </p:cm>
+</p:cmLst>
+</file>
+
+<file path=ppt/notesMasters/notesMaster1.xml><?xml version="1.0" encoding="utf-8"?>
+<p:notesMaster xmlns:a="http://schemas.openxmlformats.org/drawingml/2006/main" xmlns:r="http://schemas.openxmlformats.org/officeDocument/2006/relationships" xmlns:p="http://schemas.openxmlformats.org/presentationml/2006/main">
+  <p:cSld>
+    <p:bg>
+      <p:bgRef idx="1001">
+        <a:schemeClr val="bg1"/>
+      </p:bgRef>
+    </p:bg>
+    <p:spTree>
+      <p:nvGrpSpPr>
+        <p:cNvPr id="1" name=""/>
+        <p:cNvGrpSpPr/>
+        <p:nvPr/>
+      </p:nvGrpSpPr>
+      <p:grpSpPr>
+        <a:xfrm>
+          <a:off x="0" y="0"/>
+          <a:ext cx="0" cy="0"/>
+          <a:chOff x="0" y="0"/>
+          <a:chExt cx="0" cy="0"/>
+        </a:xfrm>
+      </p:grpSpPr>
+      <p:sp>
+        <p:nvSpPr>
+          <p:cNvPr id="2" name="מציין מיקום של כותרת עליונה 1"/>
+          <p:cNvSpPr>
+            <a:spLocks noGrp="1"/>
+          </p:cNvSpPr>
+          <p:nvPr>
+            <p:ph type="hdr" sz="quarter"/>
+          </p:nvPr>
+        </p:nvSpPr>
+        <p:spPr>
+          <a:xfrm>
+            <a:off x="3886200" y="0"/>
+            <a:ext cx="2971800" cy="458788"/>
+          </a:xfrm>
+          <a:prstGeom prst="rect">
+            <a:avLst/>
+          </a:prstGeom>
+        </p:spPr>
+        <p:txBody>
+          <a:bodyPr vert="horz" lIns="91440" tIns="45720" rIns="91440" bIns="45720" rtlCol="1"/>
+          <a:lstStyle>
+            <a:lvl1pPr algn="r">
+              <a:defRPr sz="1200"/>
+            </a:lvl1pPr>
+          </a:lstStyle>
+          <a:p>
+            <a:endParaRPr lang="he-IL"/>
+          </a:p>
+        </p:txBody>
+      </p:sp>
+      <p:sp>
+        <p:nvSpPr>
+          <p:cNvPr id="3" name="מציין מיקום של תאריך 2"/>
+          <p:cNvSpPr>
+            <a:spLocks noGrp="1"/>
+          </p:cNvSpPr>
+          <p:nvPr>
+            <p:ph type="dt" idx="1"/>
+          </p:nvPr>
+        </p:nvSpPr>
+        <p:spPr>
+          <a:xfrm>
+            <a:off x="1588" y="0"/>
+            <a:ext cx="2971800" cy="458788"/>
+          </a:xfrm>
+          <a:prstGeom prst="rect">
+            <a:avLst/>
+          </a:prstGeom>
+        </p:spPr>
+        <p:txBody>
+          <a:bodyPr vert="horz" lIns="91440" tIns="45720" rIns="91440" bIns="45720" rtlCol="1"/>
+          <a:lstStyle>
+            <a:lvl1pPr algn="l">
+              <a:defRPr sz="1200"/>
+            </a:lvl1pPr>
+          </a:lstStyle>
+          <a:p>
+            <a:fld id="{1B3020E6-DC37-4C72-B469-0F7EB0534A2A}" type="datetimeFigureOut">
+              <a:rPr lang="he-IL" smtClean="0"/>
+              <a:t>ט"ז/אדר ב/תשפ"ד</a:t>
+            </a:fld>
+            <a:endParaRPr lang="he-IL"/>
+          </a:p>
+        </p:txBody>
+      </p:sp>
+      <p:sp>
+        <p:nvSpPr>
+          <p:cNvPr id="4" name="מציין מיקום של תמונת שקופית 3"/>
+          <p:cNvSpPr>
+            <a:spLocks noGrp="1" noRot="1" noChangeAspect="1"/>
+          </p:cNvSpPr>
+          <p:nvPr>
+            <p:ph type="sldImg" idx="2"/>
+          </p:nvPr>
+        </p:nvSpPr>
+        <p:spPr>
+          <a:xfrm>
+            <a:off x="685800" y="1143000"/>
+            <a:ext cx="5486400" cy="3086100"/>
+          </a:xfrm>
+          <a:prstGeom prst="rect">
+            <a:avLst/>
+          </a:prstGeom>
+          <a:noFill/>
+          <a:ln w="12700">
+            <a:solidFill>
+              <a:prstClr val="black"/>
+            </a:solidFill>
+          </a:ln>
+        </p:spPr>
+        <p:txBody>
+          <a:bodyPr vert="horz" lIns="91440" tIns="45720" rIns="91440" bIns="45720" rtlCol="1" anchor="ctr"/>
+          <a:lstStyle/>
+          <a:p>
+            <a:endParaRPr lang="he-IL"/>
+          </a:p>
+        </p:txBody>
+      </p:sp>
+      <p:sp>
+        <p:nvSpPr>
+          <p:cNvPr id="5" name="מציין מיקום של הערות 4"/>
+          <p:cNvSpPr>
+            <a:spLocks noGrp="1"/>
+          </p:cNvSpPr>
+          <p:nvPr>
+            <p:ph type="body" sz="quarter" idx="3"/>
+          </p:nvPr>
+        </p:nvSpPr>
+        <p:spPr>
+          <a:xfrm>
+            <a:off x="685800" y="4400550"/>
+            <a:ext cx="5486400" cy="3600450"/>
+          </a:xfrm>
+          <a:prstGeom prst="rect">
+            <a:avLst/>
+          </a:prstGeom>
+        </p:spPr>
+        <p:txBody>
+          <a:bodyPr vert="horz" lIns="91440" tIns="45720" rIns="91440" bIns="45720" rtlCol="1"/>
+          <a:lstStyle/>
+          <a:p>
+            <a:pPr lvl="0"/>
+            <a:r>
+              <a:rPr lang="he-IL"/>
+              <a:t>לחץ כדי לערוך סגנונות טקסט של תבנית בסיס</a:t>
+            </a:r>
+          </a:p>
+          <a:p>
+            <a:pPr lvl="1"/>
+            <a:r>
+              <a:rPr lang="he-IL"/>
+              <a:t>רמה שנייה</a:t>
+            </a:r>
+          </a:p>
+          <a:p>
+            <a:pPr lvl="2"/>
+            <a:r>
+              <a:rPr lang="he-IL"/>
+              <a:t>רמה שלישית</a:t>
+            </a:r>
+          </a:p>
+          <a:p>
+            <a:pPr lvl="3"/>
+            <a:r>
+              <a:rPr lang="he-IL"/>
+              <a:t>רמה רביעית</a:t>
+            </a:r>
+          </a:p>
+          <a:p>
+            <a:pPr lvl="4"/>
+            <a:r>
+              <a:rPr lang="he-IL"/>
+              <a:t>רמה חמישית</a:t>
+            </a:r>
+          </a:p>
+        </p:txBody>
+      </p:sp>
+      <p:sp>
+        <p:nvSpPr>
+          <p:cNvPr id="6" name="מציין מיקום של כותרת תחתונה 5"/>
+          <p:cNvSpPr>
+            <a:spLocks noGrp="1"/>
+          </p:cNvSpPr>
+          <p:nvPr>
+            <p:ph type="ftr" sz="quarter" idx="4"/>
+          </p:nvPr>
+        </p:nvSpPr>
+        <p:spPr>
+          <a:xfrm>
+            <a:off x="3886200" y="8685213"/>
+            <a:ext cx="2971800" cy="458787"/>
+          </a:xfrm>
+          <a:prstGeom prst="rect">
+            <a:avLst/>
+          </a:prstGeom>
+        </p:spPr>
+        <p:txBody>
+          <a:bodyPr vert="horz" lIns="91440" tIns="45720" rIns="91440" bIns="45720" rtlCol="1" anchor="b"/>
+          <a:lstStyle>
+            <a:lvl1pPr algn="r">
+              <a:defRPr sz="1200"/>
+            </a:lvl1pPr>
+          </a:lstStyle>
+          <a:p>
+            <a:endParaRPr lang="he-IL"/>
+          </a:p>
+        </p:txBody>
+      </p:sp>
+      <p:sp>
+        <p:nvSpPr>
+          <p:cNvPr id="7" name="מציין מיקום של מספר שקופית 6"/>
+          <p:cNvSpPr>
+            <a:spLocks noGrp="1"/>
+          </p:cNvSpPr>
+          <p:nvPr>
+            <p:ph type="sldNum" sz="quarter" idx="5"/>
+          </p:nvPr>
+        </p:nvSpPr>
+        <p:spPr>
+          <a:xfrm>
+            <a:off x="1588" y="8685213"/>
+            <a:ext cx="2971800" cy="458787"/>
+          </a:xfrm>
+          <a:prstGeom prst="rect">
+            <a:avLst/>
+          </a:prstGeom>
+        </p:spPr>
+        <p:txBody>
+          <a:bodyPr vert="horz" lIns="91440" tIns="45720" rIns="91440" bIns="45720" rtlCol="1" anchor="b"/>
+          <a:lstStyle>
+            <a:lvl1pPr algn="l">
+              <a:defRPr sz="1200"/>
+            </a:lvl1pPr>
+          </a:lstStyle>
+          <a:p>
+            <a:fld id="{8E55A40C-8C36-4D84-BBE1-2D5414708C04}" type="slidenum">
+              <a:rPr lang="he-IL" smtClean="0"/>
+              <a:t>‹#›</a:t>
+            </a:fld>
+            <a:endParaRPr lang="he-IL"/>
+          </a:p>
+        </p:txBody>
+      </p:sp>
+    </p:spTree>
+    <p:extLst>
+      <p:ext uri="{BB962C8B-B14F-4D97-AF65-F5344CB8AC3E}">
+        <p14:creationId xmlns:p14="http://schemas.microsoft.com/office/powerpoint/2010/main" val="1446803728"/>
+      </p:ext>
+    </p:extLst>
+  </p:cSld>
+  <p:clrMap bg1="lt1" tx1="dk1" bg2="lt2" tx2="dk2" accent1="accent1" accent2="accent2" accent3="accent3" accent4="accent4" accent5="accent5" accent6="accent6" hlink="hlink" folHlink="folHlink"/>
+  <p:notesStyle>
+    <a:lvl1pPr marL="0" algn="r" defTabSz="914400" rtl="1" eaLnBrk="1" latinLnBrk="0" hangingPunct="1">
+      <a:defRPr sz="1200" kern="1200">
+        <a:solidFill>
+          <a:schemeClr val="tx1"/>
+        </a:solidFill>
+        <a:latin typeface="+mn-lt"/>
+        <a:ea typeface="+mn-ea"/>
+        <a:cs typeface="+mn-cs"/>
+      </a:defRPr>
+    </a:lvl1pPr>
+    <a:lvl2pPr marL="457200" algn="r" defTabSz="914400" rtl="1" eaLnBrk="1" latinLnBrk="0" hangingPunct="1">
+      <a:defRPr sz="1200" kern="1200">
+        <a:solidFill>
+          <a:schemeClr val="tx1"/>
+        </a:solidFill>
+        <a:latin typeface="+mn-lt"/>
+        <a:ea typeface="+mn-ea"/>
+        <a:cs typeface="+mn-cs"/>
+      </a:defRPr>
+    </a:lvl2pPr>
+    <a:lvl3pPr marL="914400" algn="r" defTabSz="914400" rtl="1" eaLnBrk="1" latinLnBrk="0" hangingPunct="1">
+      <a:defRPr sz="1200" kern="1200">
+        <a:solidFill>
+          <a:schemeClr val="tx1"/>
+        </a:solidFill>
+        <a:latin typeface="+mn-lt"/>
+        <a:ea typeface="+mn-ea"/>
+        <a:cs typeface="+mn-cs"/>
+      </a:defRPr>
+    </a:lvl3pPr>
+    <a:lvl4pPr marL="1371600" algn="r" defTabSz="914400" rtl="1" eaLnBrk="1" latinLnBrk="0" hangingPunct="1">
+      <a:defRPr sz="1200" kern="1200">
+        <a:solidFill>
+          <a:schemeClr val="tx1"/>
+        </a:solidFill>
+        <a:latin typeface="+mn-lt"/>
+        <a:ea typeface="+mn-ea"/>
+        <a:cs typeface="+mn-cs"/>
+      </a:defRPr>
+    </a:lvl4pPr>
+    <a:lvl5pPr marL="1828800" algn="r" defTabSz="914400" rtl="1" eaLnBrk="1" latinLnBrk="0" hangingPunct="1">
+      <a:defRPr sz="1200" kern="1200">
+        <a:solidFill>
+          <a:schemeClr val="tx1"/>
+        </a:solidFill>
+        <a:latin typeface="+mn-lt"/>
+        <a:ea typeface="+mn-ea"/>
+        <a:cs typeface="+mn-cs"/>
+      </a:defRPr>
+    </a:lvl5pPr>
+    <a:lvl6pPr marL="2286000" algn="r" defTabSz="914400" rtl="1" eaLnBrk="1" latinLnBrk="0" hangingPunct="1">
+      <a:defRPr sz="1200" kern="1200">
+        <a:solidFill>
+          <a:schemeClr val="tx1"/>
+        </a:solidFill>
+        <a:latin typeface="+mn-lt"/>
+        <a:ea typeface="+mn-ea"/>
+        <a:cs typeface="+mn-cs"/>
+      </a:defRPr>
+    </a:lvl6pPr>
+    <a:lvl7pPr marL="2743200" algn="r" defTabSz="914400" rtl="1" eaLnBrk="1" latinLnBrk="0" hangingPunct="1">
+      <a:defRPr sz="1200" kern="1200">
+        <a:solidFill>
+          <a:schemeClr val="tx1"/>
+        </a:solidFill>
+        <a:latin typeface="+mn-lt"/>
+        <a:ea typeface="+mn-ea"/>
+        <a:cs typeface="+mn-cs"/>
+      </a:defRPr>
+    </a:lvl7pPr>
+    <a:lvl8pPr marL="3200400" algn="r" defTabSz="914400" rtl="1" eaLnBrk="1" latinLnBrk="0" hangingPunct="1">
+      <a:defRPr sz="1200" kern="1200">
+        <a:solidFill>
+          <a:schemeClr val="tx1"/>
+        </a:solidFill>
+        <a:latin typeface="+mn-lt"/>
+        <a:ea typeface="+mn-ea"/>
+        <a:cs typeface="+mn-cs"/>
+      </a:defRPr>
+    </a:lvl8pPr>
+    <a:lvl9pPr marL="3657600" algn="r" defTabSz="914400" rtl="1" eaLnBrk="1" latinLnBrk="0" hangingPunct="1">
+      <a:defRPr sz="1200" kern="1200">
+        <a:solidFill>
+          <a:schemeClr val="tx1"/>
+        </a:solidFill>
+        <a:latin typeface="+mn-lt"/>
+        <a:ea typeface="+mn-ea"/>
+        <a:cs typeface="+mn-cs"/>
+      </a:defRPr>
+    </a:lvl9pPr>
+  </p:notesStyle>
+</p:notesMaster>
+</file>
+
 <file path=ppt/slideLayouts/slideLayout1.xml><?xml version="1.0" encoding="utf-8"?>
 <p:sldLayout xmlns:a="http://schemas.openxmlformats.org/drawingml/2006/main" xmlns:r="http://schemas.openxmlformats.org/officeDocument/2006/relationships" xmlns:p="http://schemas.openxmlformats.org/presentationml/2006/main" type="title" preserve="1">
   <p:cSld name="שקופית כותרת">
@@ -264,7 +646,7 @@
           <a:p>
             <a:fld id="{06C28339-2151-49AF-B4B9-DF404CFA876A}" type="datetimeFigureOut">
               <a:rPr lang="he-IL" smtClean="0"/>
-              <a:t>ל'/סיון/תשפ"א</a:t>
+              <a:t>ט"ז/אדר ב/תשפ"ד</a:t>
             </a:fld>
             <a:endParaRPr lang="he-IL"/>
           </a:p>
@@ -462,7 +844,7 @@
           <a:p>
             <a:fld id="{06C28339-2151-49AF-B4B9-DF404CFA876A}" type="datetimeFigureOut">
               <a:rPr lang="he-IL" smtClean="0"/>
-              <a:t>ל'/סיון/תשפ"א</a:t>
+              <a:t>ט"ז/אדר ב/תשפ"ד</a:t>
             </a:fld>
             <a:endParaRPr lang="he-IL"/>
           </a:p>
@@ -670,7 +1052,7 @@
           <a:p>
             <a:fld id="{06C28339-2151-49AF-B4B9-DF404CFA876A}" type="datetimeFigureOut">
               <a:rPr lang="he-IL" smtClean="0"/>
-              <a:t>ל'/סיון/תשפ"א</a:t>
+              <a:t>ט"ז/אדר ב/תשפ"ד</a:t>
             </a:fld>
             <a:endParaRPr lang="he-IL"/>
           </a:p>
@@ -868,7 +1250,7 @@
           <a:p>
             <a:fld id="{06C28339-2151-49AF-B4B9-DF404CFA876A}" type="datetimeFigureOut">
               <a:rPr lang="he-IL" smtClean="0"/>
-              <a:t>ל'/סיון/תשפ"א</a:t>
+              <a:t>ט"ז/אדר ב/תשפ"ד</a:t>
             </a:fld>
             <a:endParaRPr lang="he-IL"/>
           </a:p>
@@ -1143,7 +1525,7 @@
           <a:p>
             <a:fld id="{06C28339-2151-49AF-B4B9-DF404CFA876A}" type="datetimeFigureOut">
               <a:rPr lang="he-IL" smtClean="0"/>
-              <a:t>ל'/סיון/תשפ"א</a:t>
+              <a:t>ט"ז/אדר ב/תשפ"ד</a:t>
             </a:fld>
             <a:endParaRPr lang="he-IL"/>
           </a:p>
@@ -1408,7 +1790,7 @@
           <a:p>
             <a:fld id="{06C28339-2151-49AF-B4B9-DF404CFA876A}" type="datetimeFigureOut">
               <a:rPr lang="he-IL" smtClean="0"/>
-              <a:t>ל'/סיון/תשפ"א</a:t>
+              <a:t>ט"ז/אדר ב/תשפ"ד</a:t>
             </a:fld>
             <a:endParaRPr lang="he-IL"/>
           </a:p>
@@ -1820,7 +2202,7 @@
           <a:p>
             <a:fld id="{06C28339-2151-49AF-B4B9-DF404CFA876A}" type="datetimeFigureOut">
               <a:rPr lang="he-IL" smtClean="0"/>
-              <a:t>ל'/סיון/תשפ"א</a:t>
+              <a:t>ט"ז/אדר ב/תשפ"ד</a:t>
             </a:fld>
             <a:endParaRPr lang="he-IL"/>
           </a:p>
@@ -1961,7 +2343,7 @@
           <a:p>
             <a:fld id="{06C28339-2151-49AF-B4B9-DF404CFA876A}" type="datetimeFigureOut">
               <a:rPr lang="he-IL" smtClean="0"/>
-              <a:t>ל'/סיון/תשפ"א</a:t>
+              <a:t>ט"ז/אדר ב/תשפ"ד</a:t>
             </a:fld>
             <a:endParaRPr lang="he-IL"/>
           </a:p>
@@ -2074,7 +2456,7 @@
           <a:p>
             <a:fld id="{06C28339-2151-49AF-B4B9-DF404CFA876A}" type="datetimeFigureOut">
               <a:rPr lang="he-IL" smtClean="0"/>
-              <a:t>ל'/סיון/תשפ"א</a:t>
+              <a:t>ט"ז/אדר ב/תשפ"ד</a:t>
             </a:fld>
             <a:endParaRPr lang="he-IL"/>
           </a:p>
@@ -2385,7 +2767,7 @@
           <a:p>
             <a:fld id="{06C28339-2151-49AF-B4B9-DF404CFA876A}" type="datetimeFigureOut">
               <a:rPr lang="he-IL" smtClean="0"/>
-              <a:t>ל'/סיון/תשפ"א</a:t>
+              <a:t>ט"ז/אדר ב/תשפ"ד</a:t>
             </a:fld>
             <a:endParaRPr lang="he-IL"/>
           </a:p>
@@ -2673,7 +3055,7 @@
           <a:p>
             <a:fld id="{06C28339-2151-49AF-B4B9-DF404CFA876A}" type="datetimeFigureOut">
               <a:rPr lang="he-IL" smtClean="0"/>
-              <a:t>ל'/סיון/תשפ"א</a:t>
+              <a:t>ט"ז/אדר ב/תשפ"ד</a:t>
             </a:fld>
             <a:endParaRPr lang="he-IL"/>
           </a:p>
@@ -2914,7 +3296,7 @@
           <a:p>
             <a:fld id="{06C28339-2151-49AF-B4B9-DF404CFA876A}" type="datetimeFigureOut">
               <a:rPr lang="he-IL" smtClean="0"/>
-              <a:t>ל'/סיון/תשפ"א</a:t>
+              <a:t>ט"ז/אדר ב/תשפ"ד</a:t>
             </a:fld>
             <a:endParaRPr lang="he-IL"/>
           </a:p>
@@ -3452,6 +3834,249 @@
 </p:sld>
 </file>
 
+<file path=ppt/slides/slide10.xml><?xml version="1.0" encoding="utf-8"?>
+<p:sld xmlns:a="http://schemas.openxmlformats.org/drawingml/2006/main" xmlns:r="http://schemas.openxmlformats.org/officeDocument/2006/relationships" xmlns:p="http://schemas.openxmlformats.org/presentationml/2006/main">
+  <p:cSld>
+    <p:spTree>
+      <p:nvGrpSpPr>
+        <p:cNvPr id="1" name=""/>
+        <p:cNvGrpSpPr/>
+        <p:nvPr/>
+      </p:nvGrpSpPr>
+      <p:grpSpPr>
+        <a:xfrm>
+          <a:off x="0" y="0"/>
+          <a:ext cx="0" cy="0"/>
+          <a:chOff x="0" y="0"/>
+          <a:chExt cx="0" cy="0"/>
+        </a:xfrm>
+      </p:grpSpPr>
+      <p:pic>
+        <p:nvPicPr>
+          <p:cNvPr id="5" name="תמונה 4">
+            <a:extLst>
+              <a:ext uri="{FF2B5EF4-FFF2-40B4-BE49-F238E27FC236}">
+                <a16:creationId xmlns:a16="http://schemas.microsoft.com/office/drawing/2014/main" id="{6EBBE09E-6742-3BB5-7BE1-F992EC1B5728}"/>
+              </a:ext>
+            </a:extLst>
+          </p:cNvPr>
+          <p:cNvPicPr>
+            <a:picLocks noChangeAspect="1"/>
+          </p:cNvPicPr>
+          <p:nvPr/>
+        </p:nvPicPr>
+        <p:blipFill>
+          <a:blip r:embed="rId2"/>
+          <a:stretch>
+            <a:fillRect/>
+          </a:stretch>
+        </p:blipFill>
+        <p:spPr>
+          <a:xfrm>
+            <a:off x="167014" y="572623"/>
+            <a:ext cx="7962858" cy="5993277"/>
+          </a:xfrm>
+          <a:prstGeom prst="rect">
+            <a:avLst/>
+          </a:prstGeom>
+        </p:spPr>
+      </p:pic>
+      <p:sp>
+        <p:nvSpPr>
+          <p:cNvPr id="6" name="תיבת טקסט 5">
+            <a:extLst>
+              <a:ext uri="{FF2B5EF4-FFF2-40B4-BE49-F238E27FC236}">
+                <a16:creationId xmlns:a16="http://schemas.microsoft.com/office/drawing/2014/main" id="{A6FFD371-BEF3-43A5-BD0A-B7956A8A7614}"/>
+              </a:ext>
+            </a:extLst>
+          </p:cNvPr>
+          <p:cNvSpPr txBox="1"/>
+          <p:nvPr/>
+        </p:nvSpPr>
+        <p:spPr>
+          <a:xfrm>
+            <a:off x="5182223" y="38826"/>
+            <a:ext cx="1827553" cy="369332"/>
+          </a:xfrm>
+          <a:prstGeom prst="rect">
+            <a:avLst/>
+          </a:prstGeom>
+          <a:noFill/>
+        </p:spPr>
+        <p:txBody>
+          <a:bodyPr wrap="none" rtlCol="1">
+            <a:spAutoFit/>
+          </a:bodyPr>
+          <a:lstStyle/>
+          <a:p>
+            <a:r>
+              <a:rPr lang="en-US" u="sng" dirty="0">
+                <a:ln w="0"/>
+                <a:effectLst>
+                  <a:outerShdw blurRad="38100" dist="19050" dir="2700000" algn="tl" rotWithShape="0">
+                    <a:schemeClr val="dk1">
+                      <a:alpha val="40000"/>
+                    </a:schemeClr>
+                  </a:outerShdw>
+                </a:effectLst>
+              </a:rPr>
+              <a:t>Online Price Feed</a:t>
+            </a:r>
+            <a:endParaRPr lang="he-IL" u="sng" dirty="0">
+              <a:ln w="0"/>
+              <a:effectLst>
+                <a:outerShdw blurRad="38100" dist="19050" dir="2700000" algn="tl" rotWithShape="0">
+                  <a:schemeClr val="dk1">
+                    <a:alpha val="40000"/>
+                  </a:schemeClr>
+                </a:outerShdw>
+              </a:effectLst>
+            </a:endParaRPr>
+          </a:p>
+        </p:txBody>
+      </p:sp>
+      <p:sp>
+        <p:nvSpPr>
+          <p:cNvPr id="7" name="תיבת טקסט 6">
+            <a:extLst>
+              <a:ext uri="{FF2B5EF4-FFF2-40B4-BE49-F238E27FC236}">
+                <a16:creationId xmlns:a16="http://schemas.microsoft.com/office/drawing/2014/main" id="{542D58CD-ABEB-4E89-8ECC-3C3ED8683CCD}"/>
+              </a:ext>
+            </a:extLst>
+          </p:cNvPr>
+          <p:cNvSpPr txBox="1"/>
+          <p:nvPr/>
+        </p:nvSpPr>
+        <p:spPr>
+          <a:xfrm>
+            <a:off x="8334375" y="510710"/>
+            <a:ext cx="3632488" cy="2677656"/>
+          </a:xfrm>
+          <a:prstGeom prst="rect">
+            <a:avLst/>
+          </a:prstGeom>
+          <a:noFill/>
+        </p:spPr>
+        <p:txBody>
+          <a:bodyPr wrap="square" rtlCol="1">
+            <a:spAutoFit/>
+          </a:bodyPr>
+          <a:lstStyle/>
+          <a:p>
+            <a:pPr algn="l" rtl="0"/>
+            <a:r>
+              <a:rPr lang="en-US" sz="1050" dirty="0"/>
+              <a:t>The </a:t>
+            </a:r>
+            <a:r>
+              <a:rPr lang="en-US" sz="1050" b="1" dirty="0"/>
+              <a:t>price oracle </a:t>
+            </a:r>
+            <a:r>
+              <a:rPr lang="en-US" sz="1050" dirty="0"/>
+              <a:t>gets its price quotes by push notifications from </a:t>
+            </a:r>
+            <a:r>
+              <a:rPr lang="en-US" sz="1050" b="1" dirty="0"/>
+              <a:t>external providers</a:t>
+            </a:r>
+            <a:r>
+              <a:rPr lang="en-US" sz="1050" dirty="0"/>
+              <a:t>. It then feeds the prices to a </a:t>
+            </a:r>
+            <a:r>
+              <a:rPr lang="en-US" sz="1050" b="1" dirty="0"/>
+              <a:t>distributed event streaming platform </a:t>
+            </a:r>
+            <a:r>
+              <a:rPr lang="en-US" sz="1050" dirty="0"/>
+              <a:t>(SNS/Kafka) where each ticker is used as SNS topic. The </a:t>
+            </a:r>
+            <a:r>
+              <a:rPr lang="en-US" sz="1050" b="1" dirty="0"/>
+              <a:t>price senders </a:t>
+            </a:r>
+            <a:r>
+              <a:rPr lang="en-US" sz="1050" dirty="0"/>
+              <a:t>receive the prices from the streaming sources. An LB server uses </a:t>
+            </a:r>
+            <a:r>
+              <a:rPr lang="en-US" sz="1050" b="1" dirty="0"/>
+              <a:t>Redis</a:t>
+            </a:r>
+            <a:r>
+              <a:rPr lang="en-US" sz="1050" dirty="0"/>
+              <a:t> store to track senders, and when a client connects to the BE server in order to subscribe to a ticker, he receives a sender IP and which then connects to it by web sockets.</a:t>
+            </a:r>
+          </a:p>
+          <a:p>
+            <a:pPr algn="l" rtl="0"/>
+            <a:endParaRPr lang="en-US" sz="1050" dirty="0"/>
+          </a:p>
+          <a:p>
+            <a:pPr algn="l" rtl="0"/>
+            <a:r>
+              <a:rPr lang="en-US" sz="1050" dirty="0"/>
+              <a:t>We also need support for historical data retrieval. We use and ETL upon our DB to insert to a time series DB server the data grouped by granularity (1m, 5m, 10ms and so on). The client then uses a cluster of BE servers used to query that time series DB to retrieve the data. We also use caching in order to cache request where its parameters are the key and a blob containing the price data is the value.</a:t>
+            </a:r>
+            <a:endParaRPr lang="he-IL" sz="1050" dirty="0"/>
+          </a:p>
+        </p:txBody>
+      </p:sp>
+      <p:sp>
+        <p:nvSpPr>
+          <p:cNvPr id="8" name="תיבת טקסט 7">
+            <a:extLst>
+              <a:ext uri="{FF2B5EF4-FFF2-40B4-BE49-F238E27FC236}">
+                <a16:creationId xmlns:a16="http://schemas.microsoft.com/office/drawing/2014/main" id="{12B78995-996B-D5B3-6BCC-F6974AC9C3AE}"/>
+              </a:ext>
+            </a:extLst>
+          </p:cNvPr>
+          <p:cNvSpPr txBox="1"/>
+          <p:nvPr/>
+        </p:nvSpPr>
+        <p:spPr>
+          <a:xfrm>
+            <a:off x="8334375" y="3238748"/>
+            <a:ext cx="3346499" cy="400110"/>
+          </a:xfrm>
+          <a:prstGeom prst="rect">
+            <a:avLst/>
+          </a:prstGeom>
+          <a:noFill/>
+        </p:spPr>
+        <p:txBody>
+          <a:bodyPr wrap="square" rtlCol="1">
+            <a:spAutoFit/>
+          </a:bodyPr>
+          <a:lstStyle/>
+          <a:p>
+            <a:pPr algn="l" rtl="0"/>
+            <a:r>
+              <a:rPr lang="en-US" sz="1000" b="1" u="sng" dirty="0"/>
+              <a:t>Reference:</a:t>
+            </a:r>
+            <a:r>
+              <a:rPr lang="en-US" sz="1000" dirty="0"/>
+              <a:t> https://www.youtube.com/watch?v=qo3Cq13aCa4</a:t>
+            </a:r>
+            <a:endParaRPr lang="he-IL" sz="1000" dirty="0"/>
+          </a:p>
+        </p:txBody>
+      </p:sp>
+    </p:spTree>
+    <p:extLst>
+      <p:ext uri="{BB962C8B-B14F-4D97-AF65-F5344CB8AC3E}">
+        <p14:creationId xmlns:p14="http://schemas.microsoft.com/office/powerpoint/2010/main" val="2365714245"/>
+      </p:ext>
+    </p:extLst>
+  </p:cSld>
+  <p:clrMapOvr>
+    <a:masterClrMapping/>
+  </p:clrMapOvr>
+</p:sld>
+</file>
+
 <file path=ppt/slides/slide2.xml><?xml version="1.0" encoding="utf-8"?>
 <p:sld xmlns:a="http://schemas.openxmlformats.org/drawingml/2006/main" xmlns:r="http://schemas.openxmlformats.org/officeDocument/2006/relationships" xmlns:p="http://schemas.openxmlformats.org/presentationml/2006/main">
   <p:cSld>
@@ -21864,6 +22489,1560 @@
     <p:extLst>
       <p:ext uri="{BB962C8B-B14F-4D97-AF65-F5344CB8AC3E}">
         <p14:creationId xmlns:p14="http://schemas.microsoft.com/office/powerpoint/2010/main" val="2153952281"/>
+      </p:ext>
+    </p:extLst>
+  </p:cSld>
+  <p:clrMapOvr>
+    <a:masterClrMapping/>
+  </p:clrMapOvr>
+</p:sld>
+</file>
+
+<file path=ppt/slides/slide7.xml><?xml version="1.0" encoding="utf-8"?>
+<p:sld xmlns:a="http://schemas.openxmlformats.org/drawingml/2006/main" xmlns:r="http://schemas.openxmlformats.org/officeDocument/2006/relationships" xmlns:p="http://schemas.openxmlformats.org/presentationml/2006/main">
+  <p:cSld>
+    <p:spTree>
+      <p:nvGrpSpPr>
+        <p:cNvPr id="1" name=""/>
+        <p:cNvGrpSpPr/>
+        <p:nvPr/>
+      </p:nvGrpSpPr>
+      <p:grpSpPr>
+        <a:xfrm>
+          <a:off x="0" y="0"/>
+          <a:ext cx="0" cy="0"/>
+          <a:chOff x="0" y="0"/>
+          <a:chExt cx="0" cy="0"/>
+        </a:xfrm>
+      </p:grpSpPr>
+      <p:sp>
+        <p:nvSpPr>
+          <p:cNvPr id="3" name="מציין מיקום תוכן 2">
+            <a:extLst>
+              <a:ext uri="{FF2B5EF4-FFF2-40B4-BE49-F238E27FC236}">
+                <a16:creationId xmlns:a16="http://schemas.microsoft.com/office/drawing/2014/main" id="{333F346E-7CF8-F372-6C36-60317824226C}"/>
+              </a:ext>
+            </a:extLst>
+          </p:cNvPr>
+          <p:cNvSpPr>
+            <a:spLocks noGrp="1"/>
+          </p:cNvSpPr>
+          <p:nvPr>
+            <p:ph idx="1"/>
+          </p:nvPr>
+        </p:nvSpPr>
+        <p:spPr>
+          <a:xfrm>
+            <a:off x="206432" y="636905"/>
+            <a:ext cx="6086303" cy="5930150"/>
+          </a:xfrm>
+        </p:spPr>
+        <p:txBody>
+          <a:bodyPr>
+            <a:noAutofit/>
+          </a:bodyPr>
+          <a:lstStyle/>
+          <a:p>
+            <a:pPr algn="l" rtl="0">
+              <a:lnSpc>
+                <a:spcPct val="120000"/>
+              </a:lnSpc>
+            </a:pPr>
+            <a:r>
+              <a:rPr lang="en-US" sz="1200" b="0" i="0" dirty="0">
+                <a:solidFill>
+                  <a:srgbClr val="112336"/>
+                </a:solidFill>
+                <a:effectLst/>
+                <a:latin typeface="Roboto" panose="02000000000000000000" pitchFamily="2" charset="0"/>
+                <a:ea typeface="Roboto" panose="02000000000000000000" pitchFamily="2" charset="0"/>
+                <a:cs typeface="Roboto" panose="02000000000000000000" pitchFamily="2" charset="0"/>
+              </a:rPr>
+              <a:t>The main conceptual difference is the final step of the process: in ETL, clean data is loaded in the target destination store. In ELT, loading data happens before transformations - the final step is transforming the data just before data analysis. </a:t>
+            </a:r>
+          </a:p>
+          <a:p>
+            <a:pPr algn="l" rtl="0">
+              <a:lnSpc>
+                <a:spcPct val="120000"/>
+              </a:lnSpc>
+            </a:pPr>
+            <a:r>
+              <a:rPr lang="en-US" sz="1200" b="0" i="0" dirty="0">
+                <a:solidFill>
+                  <a:srgbClr val="112336"/>
+                </a:solidFill>
+                <a:effectLst/>
+                <a:latin typeface="Roboto" panose="02000000000000000000" pitchFamily="2" charset="0"/>
+                <a:ea typeface="Roboto" panose="02000000000000000000" pitchFamily="2" charset="0"/>
+                <a:cs typeface="Roboto" panose="02000000000000000000" pitchFamily="2" charset="0"/>
+              </a:rPr>
+              <a:t>In the Extract Load Transform (ELT) process, you first extract the data, and then you immediately move it into a centralized data repository. After that, data is transformed as needed for downstream use. This method gets data in front of analysts much faster than ETL while simultaneously simplifying the architecture.</a:t>
+            </a:r>
+          </a:p>
+          <a:p>
+            <a:pPr marL="0" indent="0" algn="l" rtl="0">
+              <a:lnSpc>
+                <a:spcPct val="120000"/>
+              </a:lnSpc>
+              <a:buNone/>
+            </a:pPr>
+            <a:r>
+              <a:rPr lang="en-US" sz="1200" b="1" u="sng" dirty="0">
+                <a:solidFill>
+                  <a:srgbClr val="112336"/>
+                </a:solidFill>
+                <a:latin typeface="Roboto" panose="02000000000000000000" pitchFamily="2" charset="0"/>
+                <a:ea typeface="Roboto" panose="02000000000000000000" pitchFamily="2" charset="0"/>
+                <a:cs typeface="Roboto" panose="02000000000000000000" pitchFamily="2" charset="0"/>
+              </a:rPr>
+              <a:t>ETL Technologies:</a:t>
+            </a:r>
+            <a:endParaRPr lang="en-US" sz="1200" b="1" i="0" u="sng" dirty="0">
+              <a:solidFill>
+                <a:srgbClr val="112336"/>
+              </a:solidFill>
+              <a:effectLst/>
+              <a:latin typeface="Roboto" panose="02000000000000000000" pitchFamily="2" charset="0"/>
+              <a:ea typeface="Roboto" panose="02000000000000000000" pitchFamily="2" charset="0"/>
+              <a:cs typeface="Roboto" panose="02000000000000000000" pitchFamily="2" charset="0"/>
+            </a:endParaRPr>
+          </a:p>
+          <a:p>
+            <a:pPr algn="l" rtl="0">
+              <a:lnSpc>
+                <a:spcPct val="120000"/>
+              </a:lnSpc>
+            </a:pPr>
+            <a:r>
+              <a:rPr lang="en-US" sz="1200" b="0" i="0" dirty="0">
+                <a:solidFill>
+                  <a:srgbClr val="000000"/>
+                </a:solidFill>
+                <a:effectLst/>
+                <a:latin typeface="Roboto" panose="02000000000000000000" pitchFamily="2" charset="0"/>
+                <a:ea typeface="Roboto" panose="02000000000000000000" pitchFamily="2" charset="0"/>
+                <a:cs typeface="Roboto" panose="02000000000000000000" pitchFamily="2" charset="0"/>
+              </a:rPr>
+              <a:t>The </a:t>
+            </a:r>
+            <a:r>
+              <a:rPr lang="en-US" sz="1200" b="1" i="0" dirty="0">
+                <a:solidFill>
+                  <a:srgbClr val="000000"/>
+                </a:solidFill>
+                <a:effectLst/>
+                <a:latin typeface="Roboto" panose="02000000000000000000" pitchFamily="2" charset="0"/>
+                <a:ea typeface="Roboto" panose="02000000000000000000" pitchFamily="2" charset="0"/>
+                <a:cs typeface="Roboto" panose="02000000000000000000" pitchFamily="2" charset="0"/>
+              </a:rPr>
+              <a:t>Amazon S3 Sink Connector </a:t>
+            </a:r>
+            <a:r>
+              <a:rPr lang="en-US" sz="1200" b="0" i="0" dirty="0">
+                <a:solidFill>
+                  <a:srgbClr val="000000"/>
+                </a:solidFill>
+                <a:effectLst/>
+                <a:latin typeface="Roboto" panose="02000000000000000000" pitchFamily="2" charset="0"/>
+                <a:ea typeface="Roboto" panose="02000000000000000000" pitchFamily="2" charset="0"/>
+                <a:cs typeface="Roboto" panose="02000000000000000000" pitchFamily="2" charset="0"/>
+              </a:rPr>
+              <a:t>exports data from Apache Kafka topics to S3 objects in either Avro, JSON, or Bytes formats. </a:t>
+            </a:r>
+          </a:p>
+          <a:p>
+            <a:pPr algn="l" rtl="0">
+              <a:lnSpc>
+                <a:spcPct val="120000"/>
+              </a:lnSpc>
+            </a:pPr>
+            <a:r>
+              <a:rPr lang="en-US" sz="1200" dirty="0">
+                <a:solidFill>
+                  <a:srgbClr val="000000"/>
+                </a:solidFill>
+                <a:latin typeface="Roboto" panose="02000000000000000000" pitchFamily="2" charset="0"/>
+                <a:ea typeface="Roboto" panose="02000000000000000000" pitchFamily="2" charset="0"/>
+                <a:cs typeface="Roboto" panose="02000000000000000000" pitchFamily="2" charset="0"/>
+              </a:rPr>
+              <a:t>Once in S3 we can use Using the </a:t>
+            </a:r>
+            <a:r>
+              <a:rPr lang="en-US" sz="1200" b="1" dirty="0">
+                <a:solidFill>
+                  <a:srgbClr val="000000"/>
+                </a:solidFill>
+                <a:latin typeface="Roboto" panose="02000000000000000000" pitchFamily="2" charset="0"/>
+                <a:ea typeface="Roboto" panose="02000000000000000000" pitchFamily="2" charset="0"/>
+                <a:cs typeface="Roboto" panose="02000000000000000000" pitchFamily="2" charset="0"/>
+              </a:rPr>
+              <a:t>Parquet</a:t>
+            </a:r>
+            <a:r>
+              <a:rPr lang="en-US" sz="1200" dirty="0">
+                <a:solidFill>
+                  <a:srgbClr val="000000"/>
+                </a:solidFill>
+                <a:latin typeface="Roboto" panose="02000000000000000000" pitchFamily="2" charset="0"/>
+                <a:ea typeface="Roboto" panose="02000000000000000000" pitchFamily="2" charset="0"/>
+                <a:cs typeface="Roboto" panose="02000000000000000000" pitchFamily="2" charset="0"/>
+              </a:rPr>
+              <a:t> format in </a:t>
+            </a:r>
+            <a:r>
+              <a:rPr lang="en-US" sz="1200" b="1" dirty="0">
+                <a:solidFill>
+                  <a:srgbClr val="000000"/>
+                </a:solidFill>
+                <a:latin typeface="Roboto" panose="02000000000000000000" pitchFamily="2" charset="0"/>
+                <a:ea typeface="Roboto" panose="02000000000000000000" pitchFamily="2" charset="0"/>
+                <a:cs typeface="Roboto" panose="02000000000000000000" pitchFamily="2" charset="0"/>
+              </a:rPr>
+              <a:t>AWS Glue</a:t>
+            </a:r>
+            <a:r>
+              <a:rPr lang="en-US" sz="1200" dirty="0">
+                <a:solidFill>
+                  <a:srgbClr val="000000"/>
+                </a:solidFill>
+                <a:latin typeface="Roboto" panose="02000000000000000000" pitchFamily="2" charset="0"/>
+                <a:ea typeface="Roboto" panose="02000000000000000000" pitchFamily="2" charset="0"/>
+                <a:cs typeface="Roboto" panose="02000000000000000000" pitchFamily="2" charset="0"/>
+              </a:rPr>
+              <a:t>.</a:t>
+            </a:r>
+            <a:br>
+              <a:rPr lang="en-US" sz="1200" dirty="0">
+                <a:solidFill>
+                  <a:srgbClr val="000000"/>
+                </a:solidFill>
+                <a:latin typeface="Roboto" panose="02000000000000000000" pitchFamily="2" charset="0"/>
+                <a:ea typeface="Roboto" panose="02000000000000000000" pitchFamily="2" charset="0"/>
+                <a:cs typeface="Roboto" panose="02000000000000000000" pitchFamily="2" charset="0"/>
+              </a:rPr>
+            </a:br>
+            <a:r>
+              <a:rPr lang="en-US" sz="1200" dirty="0">
+                <a:solidFill>
+                  <a:srgbClr val="000000"/>
+                </a:solidFill>
+                <a:latin typeface="Roboto" panose="02000000000000000000" pitchFamily="2" charset="0"/>
+                <a:ea typeface="Roboto" panose="02000000000000000000" pitchFamily="2" charset="0"/>
+                <a:cs typeface="Roboto" panose="02000000000000000000" pitchFamily="2" charset="0"/>
+              </a:rPr>
+              <a:t>AWS Glue retrieves data from sources and writes data to targets stored and transported in various data formats.</a:t>
+            </a:r>
+          </a:p>
+          <a:p>
+            <a:pPr algn="l" rtl="0">
+              <a:lnSpc>
+                <a:spcPct val="120000"/>
+              </a:lnSpc>
+            </a:pPr>
+            <a:r>
+              <a:rPr lang="en-US" sz="1200" dirty="0">
+                <a:solidFill>
+                  <a:srgbClr val="000000"/>
+                </a:solidFill>
+                <a:latin typeface="Roboto" panose="02000000000000000000" pitchFamily="2" charset="0"/>
+                <a:ea typeface="Roboto" panose="02000000000000000000" pitchFamily="2" charset="0"/>
+                <a:cs typeface="Roboto" panose="02000000000000000000" pitchFamily="2" charset="0"/>
+              </a:rPr>
+              <a:t>Times series in ETL: </a:t>
+            </a:r>
+            <a:r>
+              <a:rPr lang="en-US" sz="1200" b="0" i="0" dirty="0">
+                <a:solidFill>
+                  <a:srgbClr val="212529"/>
+                </a:solidFill>
+                <a:effectLst/>
+                <a:latin typeface="Roboto" panose="02000000000000000000" pitchFamily="2" charset="0"/>
+                <a:ea typeface="Roboto" panose="02000000000000000000" pitchFamily="2" charset="0"/>
+                <a:cs typeface="Roboto" panose="02000000000000000000" pitchFamily="2" charset="0"/>
+              </a:rPr>
+              <a:t>The two most popular time-series databases are </a:t>
+            </a:r>
+            <a:r>
+              <a:rPr lang="en-US" sz="1200" b="1" i="0" dirty="0" err="1">
+                <a:solidFill>
+                  <a:srgbClr val="212529"/>
+                </a:solidFill>
+                <a:effectLst/>
+                <a:latin typeface="Roboto" panose="02000000000000000000" pitchFamily="2" charset="0"/>
+                <a:ea typeface="Roboto" panose="02000000000000000000" pitchFamily="2" charset="0"/>
+                <a:cs typeface="Roboto" panose="02000000000000000000" pitchFamily="2" charset="0"/>
+              </a:rPr>
+              <a:t>InfluxDB</a:t>
+            </a:r>
+            <a:r>
+              <a:rPr lang="en-US" sz="1200" b="0" i="0" dirty="0">
+                <a:solidFill>
+                  <a:srgbClr val="212529"/>
+                </a:solidFill>
+                <a:effectLst/>
+                <a:latin typeface="Roboto" panose="02000000000000000000" pitchFamily="2" charset="0"/>
+                <a:ea typeface="Roboto" panose="02000000000000000000" pitchFamily="2" charset="0"/>
+                <a:cs typeface="Roboto" panose="02000000000000000000" pitchFamily="2" charset="0"/>
+              </a:rPr>
+              <a:t> and </a:t>
+            </a:r>
+            <a:r>
+              <a:rPr lang="en-US" sz="1200" b="1" i="0" dirty="0">
+                <a:solidFill>
+                  <a:srgbClr val="212529"/>
+                </a:solidFill>
+                <a:effectLst/>
+                <a:latin typeface="Roboto" panose="02000000000000000000" pitchFamily="2" charset="0"/>
+                <a:ea typeface="Roboto" panose="02000000000000000000" pitchFamily="2" charset="0"/>
+                <a:cs typeface="Roboto" panose="02000000000000000000" pitchFamily="2" charset="0"/>
+              </a:rPr>
+              <a:t>Prometheus</a:t>
+            </a:r>
+            <a:r>
+              <a:rPr lang="en-US" sz="1200" b="0" i="0" dirty="0">
+                <a:solidFill>
+                  <a:srgbClr val="212529"/>
+                </a:solidFill>
+                <a:effectLst/>
+                <a:latin typeface="Roboto" panose="02000000000000000000" pitchFamily="2" charset="0"/>
+                <a:ea typeface="Roboto" panose="02000000000000000000" pitchFamily="2" charset="0"/>
+                <a:cs typeface="Roboto" panose="02000000000000000000" pitchFamily="2" charset="0"/>
+              </a:rPr>
+              <a:t>, which are designed to store large volumes of time-series data and quickly perform real-time analysis on that data.</a:t>
+            </a:r>
+          </a:p>
+          <a:p>
+            <a:pPr algn="l" rtl="0">
+              <a:lnSpc>
+                <a:spcPct val="120000"/>
+              </a:lnSpc>
+            </a:pPr>
+            <a:r>
+              <a:rPr lang="en-US" sz="1200" dirty="0">
+                <a:solidFill>
+                  <a:srgbClr val="212529"/>
+                </a:solidFill>
+                <a:latin typeface="Roboto" panose="02000000000000000000" pitchFamily="2" charset="0"/>
+                <a:ea typeface="Roboto" panose="02000000000000000000" pitchFamily="2" charset="0"/>
+                <a:cs typeface="Roboto" panose="02000000000000000000" pitchFamily="2" charset="0"/>
+              </a:rPr>
+              <a:t>Column-oriented databases are better suited to OLAP scenarios: they are at least 100 times faster in processing most queries this is because the system avoids reading unnecessary columns to avoid expensive disk read operations. Also, Storing different values of the same column together often leads to better compression ratios (compared to row-oriented systems) because in real data a column often has the same, or not so many different, values for neighboring rows. </a:t>
+            </a:r>
+            <a:br>
+              <a:rPr lang="en-US" sz="1200" dirty="0">
+                <a:solidFill>
+                  <a:srgbClr val="212529"/>
+                </a:solidFill>
+                <a:latin typeface="Roboto" panose="02000000000000000000" pitchFamily="2" charset="0"/>
+                <a:ea typeface="Roboto" panose="02000000000000000000" pitchFamily="2" charset="0"/>
+                <a:cs typeface="Roboto" panose="02000000000000000000" pitchFamily="2" charset="0"/>
+              </a:rPr>
+            </a:br>
+            <a:r>
+              <a:rPr lang="en-US" sz="1200" dirty="0">
+                <a:solidFill>
+                  <a:srgbClr val="212529"/>
+                </a:solidFill>
+                <a:latin typeface="Roboto" panose="02000000000000000000" pitchFamily="2" charset="0"/>
+                <a:ea typeface="Roboto" panose="02000000000000000000" pitchFamily="2" charset="0"/>
+                <a:cs typeface="Roboto" panose="02000000000000000000" pitchFamily="2" charset="0"/>
+              </a:rPr>
+              <a:t>Reading data from parquet can be done using </a:t>
+            </a:r>
+            <a:r>
+              <a:rPr lang="en-US" sz="1200" b="1" dirty="0" err="1">
+                <a:solidFill>
+                  <a:srgbClr val="212529"/>
+                </a:solidFill>
+                <a:latin typeface="Roboto" panose="02000000000000000000" pitchFamily="2" charset="0"/>
+                <a:ea typeface="Roboto" panose="02000000000000000000" pitchFamily="2" charset="0"/>
+                <a:cs typeface="Roboto" panose="02000000000000000000" pitchFamily="2" charset="0"/>
+              </a:rPr>
+              <a:t>ClickHouse</a:t>
+            </a:r>
+            <a:r>
+              <a:rPr lang="en-US" sz="1200" dirty="0">
+                <a:solidFill>
+                  <a:srgbClr val="212529"/>
+                </a:solidFill>
+                <a:latin typeface="Roboto" panose="02000000000000000000" pitchFamily="2" charset="0"/>
+                <a:ea typeface="Roboto" panose="02000000000000000000" pitchFamily="2" charset="0"/>
+                <a:cs typeface="Roboto" panose="02000000000000000000" pitchFamily="2" charset="0"/>
+              </a:rPr>
+              <a:t>.</a:t>
+            </a:r>
+          </a:p>
+          <a:p>
+            <a:pPr marL="0" indent="0" algn="l" rtl="0">
+              <a:lnSpc>
+                <a:spcPct val="120000"/>
+              </a:lnSpc>
+              <a:buNone/>
+            </a:pPr>
+            <a:endParaRPr lang="he-IL" sz="1200" dirty="0"/>
+          </a:p>
+        </p:txBody>
+      </p:sp>
+      <p:pic>
+        <p:nvPicPr>
+          <p:cNvPr id="4" name="תמונה 3">
+            <a:extLst>
+              <a:ext uri="{FF2B5EF4-FFF2-40B4-BE49-F238E27FC236}">
+                <a16:creationId xmlns:a16="http://schemas.microsoft.com/office/drawing/2014/main" id="{F5EED81C-E43E-43C5-107B-01BFD82A00B8}"/>
+              </a:ext>
+            </a:extLst>
+          </p:cNvPr>
+          <p:cNvPicPr>
+            <a:picLocks noChangeAspect="1"/>
+          </p:cNvPicPr>
+          <p:nvPr/>
+        </p:nvPicPr>
+        <p:blipFill>
+          <a:blip r:embed="rId2"/>
+          <a:stretch>
+            <a:fillRect/>
+          </a:stretch>
+        </p:blipFill>
+        <p:spPr>
+          <a:xfrm>
+            <a:off x="6458836" y="596061"/>
+            <a:ext cx="5618172" cy="4773239"/>
+          </a:xfrm>
+          <a:prstGeom prst="rect">
+            <a:avLst/>
+          </a:prstGeom>
+        </p:spPr>
+      </p:pic>
+      <p:sp>
+        <p:nvSpPr>
+          <p:cNvPr id="5" name="תיבת טקסט 4">
+            <a:extLst>
+              <a:ext uri="{FF2B5EF4-FFF2-40B4-BE49-F238E27FC236}">
+                <a16:creationId xmlns:a16="http://schemas.microsoft.com/office/drawing/2014/main" id="{67233E29-4D59-8FE1-42ED-2376F49E433E}"/>
+              </a:ext>
+            </a:extLst>
+          </p:cNvPr>
+          <p:cNvSpPr txBox="1"/>
+          <p:nvPr/>
+        </p:nvSpPr>
+        <p:spPr>
+          <a:xfrm>
+            <a:off x="5540559" y="16626"/>
+            <a:ext cx="1110882" cy="369332"/>
+          </a:xfrm>
+          <a:prstGeom prst="rect">
+            <a:avLst/>
+          </a:prstGeom>
+          <a:noFill/>
+        </p:spPr>
+        <p:txBody>
+          <a:bodyPr wrap="none" rtlCol="1">
+            <a:spAutoFit/>
+          </a:bodyPr>
+          <a:lstStyle/>
+          <a:p>
+            <a:r>
+              <a:rPr lang="en-US" u="sng" dirty="0">
+                <a:ln w="0"/>
+                <a:effectLst>
+                  <a:outerShdw blurRad="38100" dist="19050" dir="2700000" algn="tl" rotWithShape="0">
+                    <a:schemeClr val="dk1">
+                      <a:alpha val="40000"/>
+                    </a:schemeClr>
+                  </a:outerShdw>
+                </a:effectLst>
+              </a:rPr>
+              <a:t>ETL vs ELT</a:t>
+            </a:r>
+            <a:endParaRPr lang="he-IL" u="sng" dirty="0">
+              <a:ln w="0"/>
+              <a:effectLst>
+                <a:outerShdw blurRad="38100" dist="19050" dir="2700000" algn="tl" rotWithShape="0">
+                  <a:schemeClr val="dk1">
+                    <a:alpha val="40000"/>
+                  </a:schemeClr>
+                </a:outerShdw>
+              </a:effectLst>
+            </a:endParaRPr>
+          </a:p>
+        </p:txBody>
+      </p:sp>
+      <p:sp>
+        <p:nvSpPr>
+          <p:cNvPr id="6" name="תיבת טקסט 5">
+            <a:extLst>
+              <a:ext uri="{FF2B5EF4-FFF2-40B4-BE49-F238E27FC236}">
+                <a16:creationId xmlns:a16="http://schemas.microsoft.com/office/drawing/2014/main" id="{A558CA60-B0AD-9D08-9BFF-798AFC75C3D8}"/>
+              </a:ext>
+            </a:extLst>
+          </p:cNvPr>
+          <p:cNvSpPr txBox="1"/>
+          <p:nvPr/>
+        </p:nvSpPr>
+        <p:spPr>
+          <a:xfrm>
+            <a:off x="6458836" y="5355011"/>
+            <a:ext cx="5493326" cy="1477328"/>
+          </a:xfrm>
+          <a:prstGeom prst="rect">
+            <a:avLst/>
+          </a:prstGeom>
+          <a:noFill/>
+        </p:spPr>
+        <p:txBody>
+          <a:bodyPr wrap="square">
+            <a:spAutoFit/>
+          </a:bodyPr>
+          <a:lstStyle/>
+          <a:p>
+            <a:pPr marL="285750" indent="-285750" algn="l" rtl="0">
+              <a:buFont typeface="Arial" panose="020B0604020202020204" pitchFamily="34" charset="0"/>
+              <a:buChar char="•"/>
+            </a:pPr>
+            <a:r>
+              <a:rPr lang="en-US" sz="1000" b="0" i="0" dirty="0">
+                <a:solidFill>
+                  <a:srgbClr val="202124"/>
+                </a:solidFill>
+                <a:effectLst/>
+                <a:latin typeface="Roboto" panose="02000000000000000000" pitchFamily="2" charset="0"/>
+              </a:rPr>
+              <a:t>Bigtable also excels as a storage engine for batch MapReduce operations, stream processing/analytics, and machine-learning applications. A Bigtable table is sharded into blocks of contiguous rows, called </a:t>
+            </a:r>
+            <a:r>
+              <a:rPr lang="en-US" sz="1000" b="0" i="1" dirty="0">
+                <a:solidFill>
+                  <a:srgbClr val="202124"/>
+                </a:solidFill>
+                <a:effectLst/>
+                <a:latin typeface="Roboto" panose="02000000000000000000" pitchFamily="2" charset="0"/>
+              </a:rPr>
+              <a:t>tablets</a:t>
+            </a:r>
+            <a:r>
+              <a:rPr lang="en-US" sz="1000" b="0" i="0" dirty="0">
+                <a:solidFill>
+                  <a:srgbClr val="202124"/>
+                </a:solidFill>
+                <a:effectLst/>
+                <a:latin typeface="Roboto" panose="02000000000000000000" pitchFamily="2" charset="0"/>
+              </a:rPr>
+              <a:t>, to help balance the workload of queries. (Tablets are similar to HBase regions.) Tablets are stored on Colossus, Google's file system, in </a:t>
+            </a:r>
+            <a:r>
+              <a:rPr lang="en-US" sz="1000" b="0" i="0" dirty="0" err="1">
+                <a:solidFill>
+                  <a:srgbClr val="202124"/>
+                </a:solidFill>
+                <a:effectLst/>
+                <a:latin typeface="Roboto" panose="02000000000000000000" pitchFamily="2" charset="0"/>
+              </a:rPr>
+              <a:t>SSTable</a:t>
+            </a:r>
+            <a:r>
+              <a:rPr lang="en-US" sz="1000" b="0" i="0" dirty="0">
+                <a:solidFill>
+                  <a:srgbClr val="202124"/>
+                </a:solidFill>
+                <a:effectLst/>
+                <a:latin typeface="Roboto" panose="02000000000000000000" pitchFamily="2" charset="0"/>
+              </a:rPr>
+              <a:t> format. An </a:t>
+            </a:r>
+            <a:r>
+              <a:rPr lang="en-US" sz="1000" b="0" i="0" dirty="0" err="1">
+                <a:solidFill>
+                  <a:srgbClr val="202124"/>
+                </a:solidFill>
+                <a:effectLst/>
+                <a:latin typeface="Roboto" panose="02000000000000000000" pitchFamily="2" charset="0"/>
+              </a:rPr>
+              <a:t>SSTable</a:t>
+            </a:r>
+            <a:r>
+              <a:rPr lang="en-US" sz="1000" b="0" i="0" dirty="0">
+                <a:solidFill>
+                  <a:srgbClr val="202124"/>
+                </a:solidFill>
+                <a:effectLst/>
+                <a:latin typeface="Roboto" panose="02000000000000000000" pitchFamily="2" charset="0"/>
+              </a:rPr>
+              <a:t> provides a persistent, ordered immutable map from keys to values, where both keys and values are arbitrary byte strings. Each tablet is associated with a specific Bigtable node. In addition to the </a:t>
+            </a:r>
+            <a:r>
+              <a:rPr lang="en-US" sz="1000" b="0" i="0" dirty="0" err="1">
+                <a:solidFill>
+                  <a:srgbClr val="202124"/>
+                </a:solidFill>
+                <a:effectLst/>
+                <a:latin typeface="Roboto" panose="02000000000000000000" pitchFamily="2" charset="0"/>
+              </a:rPr>
+              <a:t>SSTable</a:t>
+            </a:r>
+            <a:r>
+              <a:rPr lang="en-US" sz="1000" b="0" i="0" dirty="0">
+                <a:solidFill>
+                  <a:srgbClr val="202124"/>
+                </a:solidFill>
+                <a:effectLst/>
+                <a:latin typeface="Roboto" panose="02000000000000000000" pitchFamily="2" charset="0"/>
+              </a:rPr>
+              <a:t> files, all writes are stored in Colossus's shared log as soon as they are acknowledged by Bigtable, providing increased durability.</a:t>
+            </a:r>
+            <a:endParaRPr lang="he-IL" sz="1000" dirty="0"/>
+          </a:p>
+        </p:txBody>
+      </p:sp>
+    </p:spTree>
+    <p:extLst>
+      <p:ext uri="{BB962C8B-B14F-4D97-AF65-F5344CB8AC3E}">
+        <p14:creationId xmlns:p14="http://schemas.microsoft.com/office/powerpoint/2010/main" val="2220956568"/>
+      </p:ext>
+    </p:extLst>
+  </p:cSld>
+  <p:clrMapOvr>
+    <a:masterClrMapping/>
+  </p:clrMapOvr>
+</p:sld>
+</file>
+
+<file path=ppt/slides/slide8.xml><?xml version="1.0" encoding="utf-8"?>
+<p:sld xmlns:a="http://schemas.openxmlformats.org/drawingml/2006/main" xmlns:r="http://schemas.openxmlformats.org/officeDocument/2006/relationships" xmlns:p="http://schemas.openxmlformats.org/presentationml/2006/main">
+  <p:cSld>
+    <p:spTree>
+      <p:nvGrpSpPr>
+        <p:cNvPr id="1" name=""/>
+        <p:cNvGrpSpPr/>
+        <p:nvPr/>
+      </p:nvGrpSpPr>
+      <p:grpSpPr>
+        <a:xfrm>
+          <a:off x="0" y="0"/>
+          <a:ext cx="0" cy="0"/>
+          <a:chOff x="0" y="0"/>
+          <a:chExt cx="0" cy="0"/>
+        </a:xfrm>
+      </p:grpSpPr>
+      <p:pic>
+        <p:nvPicPr>
+          <p:cNvPr id="5" name="תמונה 4">
+            <a:extLst>
+              <a:ext uri="{FF2B5EF4-FFF2-40B4-BE49-F238E27FC236}">
+                <a16:creationId xmlns:a16="http://schemas.microsoft.com/office/drawing/2014/main" id="{485F5029-26C7-2867-A15C-C942CE6A5173}"/>
+              </a:ext>
+            </a:extLst>
+          </p:cNvPr>
+          <p:cNvPicPr>
+            <a:picLocks noChangeAspect="1"/>
+          </p:cNvPicPr>
+          <p:nvPr/>
+        </p:nvPicPr>
+        <p:blipFill>
+          <a:blip r:embed="rId2"/>
+          <a:stretch>
+            <a:fillRect/>
+          </a:stretch>
+        </p:blipFill>
+        <p:spPr>
+          <a:xfrm>
+            <a:off x="7297538" y="608930"/>
+            <a:ext cx="4475478" cy="1979064"/>
+          </a:xfrm>
+          <a:prstGeom prst="rect">
+            <a:avLst/>
+          </a:prstGeom>
+          <a:solidFill>
+            <a:srgbClr val="FFFFFF">
+              <a:shade val="85000"/>
+            </a:srgbClr>
+          </a:solidFill>
+          <a:ln w="88900" cap="sq">
+            <a:solidFill>
+              <a:srgbClr val="FFFFFF"/>
+            </a:solidFill>
+            <a:miter lim="800000"/>
+          </a:ln>
+          <a:effectLst>
+            <a:outerShdw blurRad="55000" dist="18000" dir="5400000" algn="tl" rotWithShape="0">
+              <a:srgbClr val="000000">
+                <a:alpha val="40000"/>
+              </a:srgbClr>
+            </a:outerShdw>
+          </a:effectLst>
+          <a:scene3d>
+            <a:camera prst="orthographicFront"/>
+            <a:lightRig rig="twoPt" dir="t">
+              <a:rot lat="0" lon="0" rev="7200000"/>
+            </a:lightRig>
+          </a:scene3d>
+          <a:sp3d>
+            <a:bevelT w="25400" h="19050"/>
+            <a:contourClr>
+              <a:srgbClr val="FFFFFF"/>
+            </a:contourClr>
+          </a:sp3d>
+        </p:spPr>
+      </p:pic>
+      <p:sp>
+        <p:nvSpPr>
+          <p:cNvPr id="7" name="תיבת טקסט 6">
+            <a:extLst>
+              <a:ext uri="{FF2B5EF4-FFF2-40B4-BE49-F238E27FC236}">
+                <a16:creationId xmlns:a16="http://schemas.microsoft.com/office/drawing/2014/main" id="{ABE4737D-9EE8-958F-32B5-4BB3517FBD7F}"/>
+              </a:ext>
+            </a:extLst>
+          </p:cNvPr>
+          <p:cNvSpPr txBox="1"/>
+          <p:nvPr/>
+        </p:nvSpPr>
+        <p:spPr>
+          <a:xfrm>
+            <a:off x="365760" y="2763897"/>
+            <a:ext cx="10814857" cy="3416320"/>
+          </a:xfrm>
+          <a:prstGeom prst="rect">
+            <a:avLst/>
+          </a:prstGeom>
+          <a:noFill/>
+        </p:spPr>
+        <p:txBody>
+          <a:bodyPr wrap="square">
+            <a:spAutoFit/>
+          </a:bodyPr>
+          <a:lstStyle/>
+          <a:p>
+            <a:pPr algn="l" rtl="0">
+              <a:buFont typeface="+mj-lt"/>
+              <a:buAutoNum type="arabicPeriod"/>
+            </a:pPr>
+            <a:r>
+              <a:rPr lang="en-US" b="1" i="0" dirty="0">
+                <a:solidFill>
+                  <a:srgbClr val="333333"/>
+                </a:solidFill>
+                <a:effectLst/>
+                <a:latin typeface="Encode Sans Semi Expanded"/>
+              </a:rPr>
+              <a:t>Extract data into Kafka</a:t>
+            </a:r>
+            <a:r>
+              <a:rPr lang="en-US" b="0" i="0" dirty="0">
+                <a:solidFill>
+                  <a:srgbClr val="333333"/>
+                </a:solidFill>
+                <a:effectLst/>
+                <a:latin typeface="Encode Sans Semi Expanded"/>
+              </a:rPr>
+              <a:t>: the connector pulls each row of the source table and writes it as a key/value pair into a Kafka topic. Applications interested in the state of this table read from this topic. As client applications add rows to the source table, Kafka automatically writes them as new messages to the Kafka topic, enabling a real-time data stream</a:t>
+            </a:r>
+          </a:p>
+          <a:p>
+            <a:pPr algn="l" rtl="0">
+              <a:buFont typeface="+mj-lt"/>
+              <a:buAutoNum type="arabicPeriod"/>
+            </a:pPr>
+            <a:r>
+              <a:rPr lang="en-US" b="1" i="0" dirty="0">
+                <a:solidFill>
+                  <a:srgbClr val="333333"/>
+                </a:solidFill>
+                <a:effectLst/>
+                <a:latin typeface="Encode Sans Semi Expanded"/>
+              </a:rPr>
+              <a:t>Pull data from Kafka topics</a:t>
+            </a:r>
+            <a:r>
+              <a:rPr lang="en-US" b="0" i="0" dirty="0">
+                <a:solidFill>
+                  <a:srgbClr val="333333"/>
+                </a:solidFill>
+                <a:effectLst/>
+                <a:latin typeface="Encode Sans Semi Expanded"/>
+              </a:rPr>
+              <a:t>: the ETL application extracts messages from the Kafka topic.</a:t>
+            </a:r>
+          </a:p>
+          <a:p>
+            <a:pPr algn="l" rtl="0">
+              <a:buFont typeface="+mj-lt"/>
+              <a:buAutoNum type="arabicPeriod"/>
+            </a:pPr>
+            <a:r>
+              <a:rPr lang="en-US" b="1" i="0" dirty="0">
+                <a:solidFill>
+                  <a:srgbClr val="333333"/>
+                </a:solidFill>
+                <a:effectLst/>
+                <a:latin typeface="Encode Sans Semi Expanded"/>
+              </a:rPr>
+              <a:t>Transform data in </a:t>
+            </a:r>
+            <a:r>
+              <a:rPr lang="en-US" b="1" i="0" dirty="0" err="1">
+                <a:solidFill>
+                  <a:srgbClr val="333333"/>
+                </a:solidFill>
+                <a:effectLst/>
+                <a:latin typeface="Encode Sans Semi Expanded"/>
+              </a:rPr>
+              <a:t>KStream</a:t>
+            </a:r>
+            <a:r>
+              <a:rPr lang="en-US" b="1" i="0" dirty="0">
+                <a:solidFill>
+                  <a:srgbClr val="333333"/>
+                </a:solidFill>
+                <a:effectLst/>
+                <a:latin typeface="Encode Sans Semi Expanded"/>
+              </a:rPr>
+              <a:t> objects</a:t>
+            </a:r>
+            <a:r>
+              <a:rPr lang="en-US" b="0" i="0" dirty="0">
+                <a:solidFill>
+                  <a:srgbClr val="333333"/>
+                </a:solidFill>
+                <a:effectLst/>
+                <a:latin typeface="Encode Sans Semi Expanded"/>
+              </a:rPr>
+              <a:t>: with the </a:t>
+            </a:r>
+            <a:r>
+              <a:rPr lang="en-US" b="0" i="0" u="none" strike="noStrike" dirty="0">
+                <a:solidFill>
+                  <a:srgbClr val="4F21A0"/>
+                </a:solidFill>
+                <a:effectLst/>
+                <a:latin typeface="Encode Sans Semi Expanded"/>
+                <a:hlinkClick r:id="rId3"/>
+              </a:rPr>
+              <a:t>Kafka Streams API</a:t>
+            </a:r>
+            <a:r>
+              <a:rPr lang="en-US" b="0" i="0" dirty="0">
+                <a:solidFill>
+                  <a:srgbClr val="333333"/>
+                </a:solidFill>
+                <a:effectLst/>
+                <a:latin typeface="Encode Sans Semi Expanded"/>
+              </a:rPr>
+              <a:t>, the stream processor receives one record at a time, processes it, and produces one or more output records for downstream processors. These processors can transform messages one at a time, filter them based on conditions, and perform data operations on multiple messages such as aggregation.</a:t>
+            </a:r>
+          </a:p>
+          <a:p>
+            <a:pPr algn="l" rtl="0">
+              <a:buFont typeface="+mj-lt"/>
+              <a:buAutoNum type="arabicPeriod"/>
+            </a:pPr>
+            <a:r>
+              <a:rPr lang="en-US" b="1" i="0" dirty="0">
+                <a:solidFill>
+                  <a:srgbClr val="333333"/>
+                </a:solidFill>
+                <a:effectLst/>
+                <a:latin typeface="Encode Sans Semi Expanded"/>
+              </a:rPr>
+              <a:t>Load data to other systems</a:t>
+            </a:r>
+            <a:r>
+              <a:rPr lang="en-US" b="0" i="0" dirty="0">
+                <a:solidFill>
+                  <a:srgbClr val="333333"/>
+                </a:solidFill>
+                <a:effectLst/>
+                <a:latin typeface="Encode Sans Semi Expanded"/>
+              </a:rPr>
+              <a:t>: the ETL application still holds the enriched data, and now needs to stream it into target systems, such as a data warehouse or data lake. </a:t>
+            </a:r>
+            <a:r>
+              <a:rPr lang="en-US" dirty="0">
+                <a:solidFill>
+                  <a:srgbClr val="333333"/>
+                </a:solidFill>
+                <a:latin typeface="Encode Sans Semi Expanded"/>
+              </a:rPr>
+              <a:t>We can use </a:t>
+            </a:r>
+            <a:r>
+              <a:rPr lang="en-US" b="0" i="0" dirty="0">
+                <a:solidFill>
+                  <a:srgbClr val="333333"/>
+                </a:solidFill>
+                <a:effectLst/>
+                <a:latin typeface="Encode Sans Semi Expanded"/>
+              </a:rPr>
+              <a:t>S3 Sink Connector to stream the data to Amazon S3. We can also integrate with other systems such as a Redshift data warehouse using </a:t>
+            </a:r>
+            <a:r>
+              <a:rPr lang="en-US" b="0" i="0" u="none" strike="noStrike" dirty="0">
+                <a:solidFill>
+                  <a:srgbClr val="4F21A0"/>
+                </a:solidFill>
+                <a:effectLst/>
+                <a:latin typeface="Encode Sans Semi Expanded"/>
+                <a:hlinkClick r:id="rId4"/>
+              </a:rPr>
+              <a:t>Amazon Kinesis</a:t>
+            </a:r>
+            <a:r>
+              <a:rPr lang="en-US" b="0" i="0" dirty="0">
+                <a:solidFill>
+                  <a:srgbClr val="333333"/>
+                </a:solidFill>
+                <a:effectLst/>
+                <a:latin typeface="Encode Sans Semi Expanded"/>
+              </a:rPr>
+              <a:t>.</a:t>
+            </a:r>
+          </a:p>
+        </p:txBody>
+      </p:sp>
+      <p:sp>
+        <p:nvSpPr>
+          <p:cNvPr id="10" name="תיבת טקסט 9">
+            <a:extLst>
+              <a:ext uri="{FF2B5EF4-FFF2-40B4-BE49-F238E27FC236}">
+                <a16:creationId xmlns:a16="http://schemas.microsoft.com/office/drawing/2014/main" id="{C3562F0F-275E-9995-9BD9-81EA9C63F1AE}"/>
+              </a:ext>
+            </a:extLst>
+          </p:cNvPr>
+          <p:cNvSpPr txBox="1"/>
+          <p:nvPr/>
+        </p:nvSpPr>
+        <p:spPr>
+          <a:xfrm>
+            <a:off x="5315600" y="85603"/>
+            <a:ext cx="2023503" cy="369332"/>
+          </a:xfrm>
+          <a:prstGeom prst="rect">
+            <a:avLst/>
+          </a:prstGeom>
+          <a:noFill/>
+        </p:spPr>
+        <p:txBody>
+          <a:bodyPr wrap="none" rtlCol="1">
+            <a:spAutoFit/>
+          </a:bodyPr>
+          <a:lstStyle/>
+          <a:p>
+            <a:r>
+              <a:rPr lang="en-US" u="sng" dirty="0">
+                <a:ln w="0"/>
+                <a:effectLst>
+                  <a:outerShdw blurRad="38100" dist="19050" dir="2700000" algn="tl" rotWithShape="0">
+                    <a:schemeClr val="dk1">
+                      <a:alpha val="40000"/>
+                    </a:schemeClr>
+                  </a:outerShdw>
+                </a:effectLst>
+              </a:rPr>
+              <a:t>ETL With Streaming</a:t>
+            </a:r>
+            <a:endParaRPr lang="he-IL" u="sng" dirty="0">
+              <a:ln w="0"/>
+              <a:effectLst>
+                <a:outerShdw blurRad="38100" dist="19050" dir="2700000" algn="tl" rotWithShape="0">
+                  <a:schemeClr val="dk1">
+                    <a:alpha val="40000"/>
+                  </a:schemeClr>
+                </a:outerShdw>
+              </a:effectLst>
+            </a:endParaRPr>
+          </a:p>
+        </p:txBody>
+      </p:sp>
+      <p:pic>
+        <p:nvPicPr>
+          <p:cNvPr id="20" name="תמונה 19">
+            <a:extLst>
+              <a:ext uri="{FF2B5EF4-FFF2-40B4-BE49-F238E27FC236}">
+                <a16:creationId xmlns:a16="http://schemas.microsoft.com/office/drawing/2014/main" id="{02D825E1-CD89-046A-4818-F9EC8E548245}"/>
+              </a:ext>
+            </a:extLst>
+          </p:cNvPr>
+          <p:cNvPicPr>
+            <a:picLocks noChangeAspect="1"/>
+          </p:cNvPicPr>
+          <p:nvPr/>
+        </p:nvPicPr>
+        <p:blipFill>
+          <a:blip r:embed="rId5"/>
+          <a:stretch>
+            <a:fillRect/>
+          </a:stretch>
+        </p:blipFill>
+        <p:spPr>
+          <a:xfrm>
+            <a:off x="764116" y="270269"/>
+            <a:ext cx="2120399" cy="2415323"/>
+          </a:xfrm>
+          <a:prstGeom prst="rect">
+            <a:avLst/>
+          </a:prstGeom>
+          <a:solidFill>
+            <a:srgbClr val="FFFFFF">
+              <a:shade val="85000"/>
+            </a:srgbClr>
+          </a:solidFill>
+          <a:ln w="88900" cap="sq">
+            <a:solidFill>
+              <a:srgbClr val="FFFFFF"/>
+            </a:solidFill>
+            <a:miter lim="800000"/>
+          </a:ln>
+          <a:effectLst>
+            <a:outerShdw blurRad="55000" dist="18000" dir="5400000" algn="tl" rotWithShape="0">
+              <a:srgbClr val="000000">
+                <a:alpha val="40000"/>
+              </a:srgbClr>
+            </a:outerShdw>
+          </a:effectLst>
+          <a:scene3d>
+            <a:camera prst="orthographicFront"/>
+            <a:lightRig rig="twoPt" dir="t">
+              <a:rot lat="0" lon="0" rev="7200000"/>
+            </a:lightRig>
+          </a:scene3d>
+          <a:sp3d>
+            <a:bevelT w="25400" h="19050"/>
+            <a:contourClr>
+              <a:srgbClr val="FFFFFF"/>
+            </a:contourClr>
+          </a:sp3d>
+        </p:spPr>
+      </p:pic>
+      <p:pic>
+        <p:nvPicPr>
+          <p:cNvPr id="22" name="תמונה 21">
+            <a:extLst>
+              <a:ext uri="{FF2B5EF4-FFF2-40B4-BE49-F238E27FC236}">
+                <a16:creationId xmlns:a16="http://schemas.microsoft.com/office/drawing/2014/main" id="{D88F5401-02E7-8567-D7DF-765D79E55674}"/>
+              </a:ext>
+            </a:extLst>
+          </p:cNvPr>
+          <p:cNvPicPr>
+            <a:picLocks noChangeAspect="1"/>
+          </p:cNvPicPr>
+          <p:nvPr/>
+        </p:nvPicPr>
+        <p:blipFill>
+          <a:blip r:embed="rId6"/>
+          <a:stretch>
+            <a:fillRect/>
+          </a:stretch>
+        </p:blipFill>
+        <p:spPr>
+          <a:xfrm>
+            <a:off x="3630288" y="630838"/>
+            <a:ext cx="2921477" cy="1979065"/>
+          </a:xfrm>
+          <a:prstGeom prst="rect">
+            <a:avLst/>
+          </a:prstGeom>
+          <a:solidFill>
+            <a:srgbClr val="FFFFFF">
+              <a:shade val="85000"/>
+            </a:srgbClr>
+          </a:solidFill>
+          <a:ln w="88900" cap="sq">
+            <a:solidFill>
+              <a:srgbClr val="FFFFFF"/>
+            </a:solidFill>
+            <a:miter lim="800000"/>
+          </a:ln>
+          <a:effectLst>
+            <a:outerShdw blurRad="55000" dist="18000" dir="5400000" algn="tl" rotWithShape="0">
+              <a:srgbClr val="000000">
+                <a:alpha val="40000"/>
+              </a:srgbClr>
+            </a:outerShdw>
+          </a:effectLst>
+          <a:scene3d>
+            <a:camera prst="orthographicFront"/>
+            <a:lightRig rig="twoPt" dir="t">
+              <a:rot lat="0" lon="0" rev="7200000"/>
+            </a:lightRig>
+          </a:scene3d>
+          <a:sp3d>
+            <a:bevelT w="25400" h="19050"/>
+            <a:contourClr>
+              <a:srgbClr val="FFFFFF"/>
+            </a:contourClr>
+          </a:sp3d>
+        </p:spPr>
+      </p:pic>
+    </p:spTree>
+    <p:extLst>
+      <p:ext uri="{BB962C8B-B14F-4D97-AF65-F5344CB8AC3E}">
+        <p14:creationId xmlns:p14="http://schemas.microsoft.com/office/powerpoint/2010/main" val="1536570386"/>
+      </p:ext>
+    </p:extLst>
+  </p:cSld>
+  <p:clrMapOvr>
+    <a:masterClrMapping/>
+  </p:clrMapOvr>
+</p:sld>
+</file>
+
+<file path=ppt/slides/slide9.xml><?xml version="1.0" encoding="utf-8"?>
+<p:sld xmlns:a="http://schemas.openxmlformats.org/drawingml/2006/main" xmlns:r="http://schemas.openxmlformats.org/officeDocument/2006/relationships" xmlns:p="http://schemas.openxmlformats.org/presentationml/2006/main">
+  <p:cSld>
+    <p:spTree>
+      <p:nvGrpSpPr>
+        <p:cNvPr id="1" name=""/>
+        <p:cNvGrpSpPr/>
+        <p:nvPr/>
+      </p:nvGrpSpPr>
+      <p:grpSpPr>
+        <a:xfrm>
+          <a:off x="0" y="0"/>
+          <a:ext cx="0" cy="0"/>
+          <a:chOff x="0" y="0"/>
+          <a:chExt cx="0" cy="0"/>
+        </a:xfrm>
+      </p:grpSpPr>
+      <p:sp>
+        <p:nvSpPr>
+          <p:cNvPr id="10" name="תיבת טקסט 9">
+            <a:extLst>
+              <a:ext uri="{FF2B5EF4-FFF2-40B4-BE49-F238E27FC236}">
+                <a16:creationId xmlns:a16="http://schemas.microsoft.com/office/drawing/2014/main" id="{C3562F0F-275E-9995-9BD9-81EA9C63F1AE}"/>
+              </a:ext>
+            </a:extLst>
+          </p:cNvPr>
+          <p:cNvSpPr txBox="1"/>
+          <p:nvPr/>
+        </p:nvSpPr>
+        <p:spPr>
+          <a:xfrm>
+            <a:off x="4177213" y="83127"/>
+            <a:ext cx="3976538" cy="369332"/>
+          </a:xfrm>
+          <a:prstGeom prst="rect">
+            <a:avLst/>
+          </a:prstGeom>
+          <a:noFill/>
+        </p:spPr>
+        <p:txBody>
+          <a:bodyPr wrap="none" rtlCol="1">
+            <a:spAutoFit/>
+          </a:bodyPr>
+          <a:lstStyle/>
+          <a:p>
+            <a:r>
+              <a:rPr lang="en-US" u="sng" dirty="0">
+                <a:ln w="0"/>
+                <a:effectLst>
+                  <a:outerShdw blurRad="38100" dist="19050" dir="2700000" algn="tl" rotWithShape="0">
+                    <a:schemeClr val="dk1">
+                      <a:alpha val="40000"/>
+                    </a:schemeClr>
+                  </a:outerShdw>
+                </a:effectLst>
+              </a:rPr>
+              <a:t>Airflow – A Task Scheduler Architecture</a:t>
+            </a:r>
+            <a:endParaRPr lang="he-IL" u="sng" dirty="0">
+              <a:ln w="0"/>
+              <a:effectLst>
+                <a:outerShdw blurRad="38100" dist="19050" dir="2700000" algn="tl" rotWithShape="0">
+                  <a:schemeClr val="dk1">
+                    <a:alpha val="40000"/>
+                  </a:schemeClr>
+                </a:outerShdw>
+              </a:effectLst>
+            </a:endParaRPr>
+          </a:p>
+        </p:txBody>
+      </p:sp>
+      <p:pic>
+        <p:nvPicPr>
+          <p:cNvPr id="3" name="תמונה 2">
+            <a:extLst>
+              <a:ext uri="{FF2B5EF4-FFF2-40B4-BE49-F238E27FC236}">
+                <a16:creationId xmlns:a16="http://schemas.microsoft.com/office/drawing/2014/main" id="{9D200352-7F7E-CEFE-8B28-CFFC91BC4B76}"/>
+              </a:ext>
+            </a:extLst>
+          </p:cNvPr>
+          <p:cNvPicPr>
+            <a:picLocks noChangeAspect="1"/>
+          </p:cNvPicPr>
+          <p:nvPr/>
+        </p:nvPicPr>
+        <p:blipFill>
+          <a:blip r:embed="rId2"/>
+          <a:stretch>
+            <a:fillRect/>
+          </a:stretch>
+        </p:blipFill>
+        <p:spPr>
+          <a:xfrm>
+            <a:off x="7974270" y="615814"/>
+            <a:ext cx="3842228" cy="1742101"/>
+          </a:xfrm>
+          <a:prstGeom prst="rect">
+            <a:avLst/>
+          </a:prstGeom>
+          <a:solidFill>
+            <a:srgbClr val="FFFFFF">
+              <a:shade val="85000"/>
+            </a:srgbClr>
+          </a:solidFill>
+          <a:ln w="88900" cap="sq">
+            <a:solidFill>
+              <a:srgbClr val="FFFFFF"/>
+            </a:solidFill>
+            <a:miter lim="800000"/>
+          </a:ln>
+          <a:effectLst>
+            <a:outerShdw blurRad="55000" dist="18000" dir="5400000" algn="tl" rotWithShape="0">
+              <a:srgbClr val="000000">
+                <a:alpha val="40000"/>
+              </a:srgbClr>
+            </a:outerShdw>
+          </a:effectLst>
+          <a:scene3d>
+            <a:camera prst="orthographicFront"/>
+            <a:lightRig rig="twoPt" dir="t">
+              <a:rot lat="0" lon="0" rev="7200000"/>
+            </a:lightRig>
+          </a:scene3d>
+          <a:sp3d>
+            <a:bevelT w="25400" h="19050"/>
+            <a:contourClr>
+              <a:srgbClr val="FFFFFF"/>
+            </a:contourClr>
+          </a:sp3d>
+        </p:spPr>
+      </p:pic>
+      <p:sp>
+        <p:nvSpPr>
+          <p:cNvPr id="6" name="תיבת טקסט 5">
+            <a:extLst>
+              <a:ext uri="{FF2B5EF4-FFF2-40B4-BE49-F238E27FC236}">
+                <a16:creationId xmlns:a16="http://schemas.microsoft.com/office/drawing/2014/main" id="{293C1C7E-8018-3A16-5496-5B87AA65D688}"/>
+              </a:ext>
+            </a:extLst>
+          </p:cNvPr>
+          <p:cNvSpPr txBox="1"/>
+          <p:nvPr/>
+        </p:nvSpPr>
+        <p:spPr>
+          <a:xfrm>
+            <a:off x="646313" y="707256"/>
+            <a:ext cx="7192589" cy="5693866"/>
+          </a:xfrm>
+          <a:prstGeom prst="rect">
+            <a:avLst/>
+          </a:prstGeom>
+          <a:noFill/>
+        </p:spPr>
+        <p:txBody>
+          <a:bodyPr wrap="square">
+            <a:spAutoFit/>
+          </a:bodyPr>
+          <a:lstStyle/>
+          <a:p>
+            <a:pPr algn="l" rtl="0"/>
+            <a:r>
+              <a:rPr lang="en-US" sz="1400" b="1" i="0" u="sng" dirty="0">
+                <a:solidFill>
+                  <a:srgbClr val="242424"/>
+                </a:solidFill>
+                <a:effectLst/>
+                <a:latin typeface="source-serif-pro"/>
+              </a:rPr>
+              <a:t>Scheduler:</a:t>
+            </a:r>
+            <a:br>
+              <a:rPr lang="en-US" sz="1400" dirty="0"/>
+            </a:br>
+            <a:r>
+              <a:rPr lang="en-US" sz="1400" b="0" i="0" dirty="0">
+                <a:solidFill>
+                  <a:srgbClr val="242424"/>
+                </a:solidFill>
+                <a:effectLst/>
+                <a:latin typeface="source-serif-pro"/>
+              </a:rPr>
+              <a:t>The scheduler is a critical component of Airflow. Its primary function is to continuously scan the DAGs (Directed Acyclic Graphs) directory to identify and schedule tasks based on their dependencies and specified time intervals. The scheduler is responsible for determining which tasks to execute and when. It interacts with the metadata database to store and retrieve task state and execution information.</a:t>
+            </a:r>
+            <a:endParaRPr lang="en-US" sz="1400" dirty="0">
+              <a:solidFill>
+                <a:srgbClr val="242424"/>
+              </a:solidFill>
+              <a:latin typeface="source-serif-pro"/>
+            </a:endParaRPr>
+          </a:p>
+          <a:p>
+            <a:pPr algn="l" rtl="0"/>
+            <a:endParaRPr lang="en-US" sz="1400" b="0" i="0" dirty="0">
+              <a:solidFill>
+                <a:srgbClr val="242424"/>
+              </a:solidFill>
+              <a:effectLst/>
+              <a:latin typeface="source-serif-pro"/>
+            </a:endParaRPr>
+          </a:p>
+          <a:p>
+            <a:pPr algn="l" rtl="0"/>
+            <a:r>
+              <a:rPr lang="en-US" sz="1400" b="1" i="0" u="sng" dirty="0">
+                <a:solidFill>
+                  <a:srgbClr val="242424"/>
+                </a:solidFill>
+                <a:effectLst/>
+                <a:latin typeface="source-serif-pro"/>
+              </a:rPr>
+              <a:t>Executors:</a:t>
+            </a:r>
+          </a:p>
+          <a:p>
+            <a:pPr algn="l" rtl="0"/>
+            <a:r>
+              <a:rPr lang="en-US" sz="1400" b="0" i="0" dirty="0">
+                <a:solidFill>
+                  <a:srgbClr val="242424"/>
+                </a:solidFill>
+                <a:effectLst/>
+                <a:latin typeface="source-serif-pro"/>
+              </a:rPr>
+              <a:t>Airflow supports different executor types to execute tasks. The executor is responsible for allocating resources and running tasks on the specified worker nodes. The two primary executor types in Airflow are:</a:t>
+            </a:r>
+          </a:p>
+          <a:p>
+            <a:pPr lvl="1" algn="l" rtl="0"/>
+            <a:endParaRPr lang="en-US" sz="1400" b="0" i="0" dirty="0">
+              <a:solidFill>
+                <a:srgbClr val="242424"/>
+              </a:solidFill>
+              <a:effectLst/>
+              <a:latin typeface="source-serif-pro"/>
+            </a:endParaRPr>
+          </a:p>
+          <a:p>
+            <a:pPr marL="285750" indent="-285750" algn="l" rtl="0">
+              <a:buFont typeface="Arial" panose="020B0604020202020204" pitchFamily="34" charset="0"/>
+              <a:buChar char="•"/>
+            </a:pPr>
+            <a:r>
+              <a:rPr lang="en-US" sz="1400" b="0" i="0" dirty="0">
+                <a:solidFill>
+                  <a:srgbClr val="242424"/>
+                </a:solidFill>
+                <a:effectLst/>
+                <a:latin typeface="source-serif-pro"/>
+              </a:rPr>
+              <a:t>Sequential Executor: The sequential executor executes tasks sequentially on a single worker node. It is useful for local development and testing scenarios where parallelism is not a requirement.</a:t>
+            </a:r>
+          </a:p>
+          <a:p>
+            <a:pPr marL="285750" indent="-285750" algn="l" rtl="0">
+              <a:buFont typeface="Arial" panose="020B0604020202020204" pitchFamily="34" charset="0"/>
+              <a:buChar char="•"/>
+            </a:pPr>
+            <a:r>
+              <a:rPr lang="en-US" sz="1400" b="1" i="0" dirty="0">
+                <a:solidFill>
+                  <a:srgbClr val="242424"/>
+                </a:solidFill>
+                <a:effectLst/>
+                <a:latin typeface="source-serif-pro"/>
+              </a:rPr>
+              <a:t>Distributed Executors</a:t>
+            </a:r>
+            <a:r>
+              <a:rPr lang="en-US" sz="1400" b="0" i="0" dirty="0">
+                <a:solidFill>
+                  <a:srgbClr val="242424"/>
+                </a:solidFill>
+                <a:effectLst/>
+                <a:latin typeface="source-serif-pro"/>
+              </a:rPr>
+              <a:t>: Airflow also supports distributed executors like the Celery Executor and the Kubernetes Executor. These executors distribute task execution across multiple worker nodes or containers, enabling parallel processing of tasks.</a:t>
+            </a:r>
+          </a:p>
+          <a:p>
+            <a:pPr marL="285750" indent="-285750" algn="l" rtl="0">
+              <a:buFont typeface="Arial" panose="020B0604020202020204" pitchFamily="34" charset="0"/>
+              <a:buChar char="•"/>
+            </a:pPr>
+            <a:endParaRPr lang="en-US" sz="1400" dirty="0">
+              <a:solidFill>
+                <a:srgbClr val="242424"/>
+              </a:solidFill>
+              <a:latin typeface="source-serif-pro"/>
+            </a:endParaRPr>
+          </a:p>
+          <a:p>
+            <a:pPr algn="l" rtl="0"/>
+            <a:r>
+              <a:rPr lang="en-US" sz="1400" b="1" i="0" u="sng" dirty="0">
+                <a:solidFill>
+                  <a:srgbClr val="242424"/>
+                </a:solidFill>
+                <a:effectLst/>
+                <a:latin typeface="source-serif-pro"/>
+              </a:rPr>
+              <a:t>Message Queue:</a:t>
+            </a:r>
+            <a:br>
+              <a:rPr lang="en-US" sz="1400" dirty="0"/>
+            </a:br>
+            <a:r>
+              <a:rPr lang="en-US" sz="1400" b="0" i="0" dirty="0">
+                <a:solidFill>
+                  <a:srgbClr val="242424"/>
+                </a:solidFill>
+                <a:effectLst/>
+                <a:latin typeface="source-serif-pro"/>
+              </a:rPr>
+              <a:t>Airflow relies on a message queue system, such as RabbitMQ, Apache Kafka, or Redis, to enable communication between the scheduler and the worker nodes. The scheduler places task execution requests in the message queue, and the worker nodes pick up these requests, execute the tasks, and update their status back to the metadata database. The message queue acts as a communication channel, ensuring </a:t>
+            </a:r>
+            <a:r>
+              <a:rPr lang="en-US" sz="1400" b="0" i="0" u="sng" dirty="0">
+                <a:solidFill>
+                  <a:srgbClr val="242424"/>
+                </a:solidFill>
+                <a:effectLst/>
+                <a:latin typeface="source-serif-pro"/>
+              </a:rPr>
+              <a:t>reliable task distribution and coordination</a:t>
+            </a:r>
+            <a:r>
+              <a:rPr lang="en-US" sz="1400" b="0" i="0" dirty="0">
+                <a:solidFill>
+                  <a:srgbClr val="242424"/>
+                </a:solidFill>
+                <a:effectLst/>
+                <a:latin typeface="source-serif-pro"/>
+              </a:rPr>
+              <a:t>.</a:t>
+            </a:r>
+          </a:p>
+          <a:p>
+            <a:pPr marL="342900" indent="-342900" algn="l" rtl="0">
+              <a:buAutoNum type="arabicPeriod"/>
+            </a:pPr>
+            <a:endParaRPr lang="he-IL" sz="1400" dirty="0"/>
+          </a:p>
+        </p:txBody>
+      </p:sp>
+      <p:sp>
+        <p:nvSpPr>
+          <p:cNvPr id="8" name="תיבת טקסט 7">
+            <a:extLst>
+              <a:ext uri="{FF2B5EF4-FFF2-40B4-BE49-F238E27FC236}">
+                <a16:creationId xmlns:a16="http://schemas.microsoft.com/office/drawing/2014/main" id="{AAA24C9E-4384-DEA2-4C87-6264DD19CA44}"/>
+              </a:ext>
+            </a:extLst>
+          </p:cNvPr>
+          <p:cNvSpPr txBox="1"/>
+          <p:nvPr/>
+        </p:nvSpPr>
+        <p:spPr>
+          <a:xfrm>
+            <a:off x="7847215" y="2456795"/>
+            <a:ext cx="4222865" cy="4185761"/>
+          </a:xfrm>
+          <a:prstGeom prst="rect">
+            <a:avLst/>
+          </a:prstGeom>
+          <a:noFill/>
+        </p:spPr>
+        <p:txBody>
+          <a:bodyPr wrap="square" rtlCol="1">
+            <a:spAutoFit/>
+          </a:bodyPr>
+          <a:lstStyle/>
+          <a:p>
+            <a:pPr algn="l"/>
+            <a:r>
+              <a:rPr lang="en-US" sz="1400" b="1" i="0" u="sng" dirty="0">
+                <a:solidFill>
+                  <a:srgbClr val="242424"/>
+                </a:solidFill>
+                <a:effectLst/>
+                <a:latin typeface="source-serif-pro"/>
+              </a:rPr>
+              <a:t>Metadata Database:</a:t>
+            </a:r>
+            <a:br>
+              <a:rPr lang="en-US" sz="1400" b="0" i="0" dirty="0">
+                <a:solidFill>
+                  <a:srgbClr val="242424"/>
+                </a:solidFill>
+                <a:effectLst/>
+                <a:latin typeface="source-serif-pro"/>
+              </a:rPr>
+            </a:br>
+            <a:r>
+              <a:rPr lang="en-US" sz="1400" b="0" i="0" dirty="0">
+                <a:solidFill>
+                  <a:srgbClr val="242424"/>
+                </a:solidFill>
+                <a:effectLst/>
+                <a:latin typeface="source-serif-pro"/>
+              </a:rPr>
+              <a:t>Airflow leverages a metadata database, such as PostgreSQL or MySQL, to store all the configuration details, task states, and execution metadata. The metadata database provides persistence and ensures that Airflow can recover from failures and resume tasks from their last known state. It also serves as a central repository for managing and monitoring task execution.</a:t>
+            </a:r>
+            <a:endParaRPr lang="he-IL" sz="1400" b="0" i="0" dirty="0">
+              <a:solidFill>
+                <a:srgbClr val="242424"/>
+              </a:solidFill>
+              <a:effectLst/>
+              <a:latin typeface="source-serif-pro"/>
+            </a:endParaRPr>
+          </a:p>
+          <a:p>
+            <a:pPr algn="l"/>
+            <a:endParaRPr lang="en-US" sz="1400" b="0" i="0" dirty="0">
+              <a:solidFill>
+                <a:srgbClr val="242424"/>
+              </a:solidFill>
+              <a:effectLst/>
+              <a:latin typeface="source-serif-pro"/>
+            </a:endParaRPr>
+          </a:p>
+          <a:p>
+            <a:pPr algn="l"/>
+            <a:r>
+              <a:rPr lang="en-US" sz="1400" b="1" i="0" u="sng" dirty="0">
+                <a:solidFill>
+                  <a:srgbClr val="242424"/>
+                </a:solidFill>
+                <a:effectLst/>
+                <a:latin typeface="source-serif-pro"/>
+              </a:rPr>
+              <a:t>Web Server:</a:t>
+            </a:r>
+            <a:br>
+              <a:rPr lang="en-US" sz="1400" b="0" i="0" dirty="0">
+                <a:solidFill>
+                  <a:srgbClr val="242424"/>
+                </a:solidFill>
+                <a:effectLst/>
+                <a:latin typeface="source-serif-pro"/>
+              </a:rPr>
+            </a:br>
+            <a:r>
+              <a:rPr lang="en-US" sz="1400" b="0" i="0" dirty="0">
+                <a:solidFill>
+                  <a:srgbClr val="242424"/>
+                </a:solidFill>
+                <a:effectLst/>
+                <a:latin typeface="source-serif-pro"/>
+              </a:rPr>
+              <a:t>The web server component provides a user interface for interacting with Airflow. It enables users to monitor task execution, view the status of DAGs, and access logs and other operational information. The web server communicates with the metadata database to fetch relevant information and presents it in a user-friendly manner. Users can trigger manual task runs, monitor task progress, and configure Airflow settings through the web server interface.</a:t>
+            </a:r>
+          </a:p>
+        </p:txBody>
+      </p:sp>
+    </p:spTree>
+    <p:extLst>
+      <p:ext uri="{BB962C8B-B14F-4D97-AF65-F5344CB8AC3E}">
+        <p14:creationId xmlns:p14="http://schemas.microsoft.com/office/powerpoint/2010/main" val="1947687409"/>
       </p:ext>
     </p:extLst>
   </p:cSld>
@@ -22166,4 +24345,299 @@
     </a:ext>
   </a:extLst>
 </a:theme>
+</file>
+
+<file path=ppt/theme/theme2.xml><?xml version="1.0" encoding="utf-8"?>
+<a:theme xmlns:a="http://schemas.openxmlformats.org/drawingml/2006/main" name="ערכת נושא Office">
+  <a:themeElements>
+    <a:clrScheme name="Office">
+      <a:dk1>
+        <a:sysClr val="windowText" lastClr="000000"/>
+      </a:dk1>
+      <a:lt1>
+        <a:sysClr val="window" lastClr="FFFFFF"/>
+      </a:lt1>
+      <a:dk2>
+        <a:srgbClr val="44546A"/>
+      </a:dk2>
+      <a:lt2>
+        <a:srgbClr val="E7E6E6"/>
+      </a:lt2>
+      <a:accent1>
+        <a:srgbClr val="4472C4"/>
+      </a:accent1>
+      <a:accent2>
+        <a:srgbClr val="ED7D31"/>
+      </a:accent2>
+      <a:accent3>
+        <a:srgbClr val="A5A5A5"/>
+      </a:accent3>
+      <a:accent4>
+        <a:srgbClr val="FFC000"/>
+      </a:accent4>
+      <a:accent5>
+        <a:srgbClr val="5B9BD5"/>
+      </a:accent5>
+      <a:accent6>
+        <a:srgbClr val="70AD47"/>
+      </a:accent6>
+      <a:hlink>
+        <a:srgbClr val="0563C1"/>
+      </a:hlink>
+      <a:folHlink>
+        <a:srgbClr val="954F72"/>
+      </a:folHlink>
+    </a:clrScheme>
+    <a:fontScheme name="Office">
+      <a:majorFont>
+        <a:latin typeface="Calibri Light" panose="020F0302020204030204"/>
+        <a:ea typeface=""/>
+        <a:cs typeface=""/>
+        <a:font script="Jpan" typeface="游ゴシック Light"/>
+        <a:font script="Hang" typeface="맑은 고딕"/>
+        <a:font script="Hans" typeface="等线 Light"/>
+        <a:font script="Hant" typeface="新細明體"/>
+        <a:font script="Arab" typeface="Times New Roman"/>
+        <a:font script="Hebr" typeface="Times New Roman"/>
+        <a:font script="Thai" typeface="Angsana New"/>
+        <a:font script="Ethi" typeface="Nyala"/>
+        <a:font script="Beng" typeface="Vrinda"/>
+        <a:font script="Gujr" typeface="Shruti"/>
+        <a:font script="Khmr" typeface="MoolBoran"/>
+        <a:font script="Knda" typeface="Tunga"/>
+        <a:font script="Guru" typeface="Raavi"/>
+        <a:font script="Cans" typeface="Euphemia"/>
+        <a:font script="Cher" typeface="Plantagenet Cherokee"/>
+        <a:font script="Yiii" typeface="Microsoft Yi Baiti"/>
+        <a:font script="Tibt" typeface="Microsoft Himalaya"/>
+        <a:font script="Thaa" typeface="MV Boli"/>
+        <a:font script="Deva" typeface="Mangal"/>
+        <a:font script="Telu" typeface="Gautami"/>
+        <a:font script="Taml" typeface="Latha"/>
+        <a:font script="Syrc" typeface="Estrangelo Edessa"/>
+        <a:font script="Orya" typeface="Kalinga"/>
+        <a:font script="Mlym" typeface="Kartika"/>
+        <a:font script="Laoo" typeface="DokChampa"/>
+        <a:font script="Sinh" typeface="Iskoola Pota"/>
+        <a:font script="Mong" typeface="Mongolian Baiti"/>
+        <a:font script="Viet" typeface="Times New Roman"/>
+        <a:font script="Uigh" typeface="Microsoft Uighur"/>
+        <a:font script="Geor" typeface="Sylfaen"/>
+        <a:font script="Armn" typeface="Arial"/>
+        <a:font script="Bugi" typeface="Leelawadee UI"/>
+        <a:font script="Bopo" typeface="Microsoft JhengHei"/>
+        <a:font script="Java" typeface="Javanese Text"/>
+        <a:font script="Lisu" typeface="Segoe UI"/>
+        <a:font script="Mymr" typeface="Myanmar Text"/>
+        <a:font script="Nkoo" typeface="Ebrima"/>
+        <a:font script="Olck" typeface="Nirmala UI"/>
+        <a:font script="Osma" typeface="Ebrima"/>
+        <a:font script="Phag" typeface="Phagspa"/>
+        <a:font script="Syrn" typeface="Estrangelo Edessa"/>
+        <a:font script="Syrj" typeface="Estrangelo Edessa"/>
+        <a:font script="Syre" typeface="Estrangelo Edessa"/>
+        <a:font script="Sora" typeface="Nirmala UI"/>
+        <a:font script="Tale" typeface="Microsoft Tai Le"/>
+        <a:font script="Talu" typeface="Microsoft New Tai Lue"/>
+        <a:font script="Tfng" typeface="Ebrima"/>
+      </a:majorFont>
+      <a:minorFont>
+        <a:latin typeface="Calibri" panose="020F0502020204030204"/>
+        <a:ea typeface=""/>
+        <a:cs typeface=""/>
+        <a:font script="Jpan" typeface="游ゴシック"/>
+        <a:font script="Hang" typeface="맑은 고딕"/>
+        <a:font script="Hans" typeface="等线"/>
+        <a:font script="Hant" typeface="新細明體"/>
+        <a:font script="Arab" typeface="Arial"/>
+        <a:font script="Hebr" typeface="Arial"/>
+        <a:font script="Thai" typeface="Cordia New"/>
+        <a:font script="Ethi" typeface="Nyala"/>
+        <a:font script="Beng" typeface="Vrinda"/>
+        <a:font script="Gujr" typeface="Shruti"/>
+        <a:font script="Khmr" typeface="DaunPenh"/>
+        <a:font script="Knda" typeface="Tunga"/>
+        <a:font script="Guru" typeface="Raavi"/>
+        <a:font script="Cans" typeface="Euphemia"/>
+        <a:font script="Cher" typeface="Plantagenet Cherokee"/>
+        <a:font script="Yiii" typeface="Microsoft Yi Baiti"/>
+        <a:font script="Tibt" typeface="Microsoft Himalaya"/>
+        <a:font script="Thaa" typeface="MV Boli"/>
+        <a:font script="Deva" typeface="Mangal"/>
+        <a:font script="Telu" typeface="Gautami"/>
+        <a:font script="Taml" typeface="Latha"/>
+        <a:font script="Syrc" typeface="Estrangelo Edessa"/>
+        <a:font script="Orya" typeface="Kalinga"/>
+        <a:font script="Mlym" typeface="Kartika"/>
+        <a:font script="Laoo" typeface="DokChampa"/>
+        <a:font script="Sinh" typeface="Iskoola Pota"/>
+        <a:font script="Mong" typeface="Mongolian Baiti"/>
+        <a:font script="Viet" typeface="Arial"/>
+        <a:font script="Uigh" typeface="Microsoft Uighur"/>
+        <a:font script="Geor" typeface="Sylfaen"/>
+        <a:font script="Armn" typeface="Arial"/>
+        <a:font script="Bugi" typeface="Leelawadee UI"/>
+        <a:font script="Bopo" typeface="Microsoft JhengHei"/>
+        <a:font script="Java" typeface="Javanese Text"/>
+        <a:font script="Lisu" typeface="Segoe UI"/>
+        <a:font script="Mymr" typeface="Myanmar Text"/>
+        <a:font script="Nkoo" typeface="Ebrima"/>
+        <a:font script="Olck" typeface="Nirmala UI"/>
+        <a:font script="Osma" typeface="Ebrima"/>
+        <a:font script="Phag" typeface="Phagspa"/>
+        <a:font script="Syrn" typeface="Estrangelo Edessa"/>
+        <a:font script="Syrj" typeface="Estrangelo Edessa"/>
+        <a:font script="Syre" typeface="Estrangelo Edessa"/>
+        <a:font script="Sora" typeface="Nirmala UI"/>
+        <a:font script="Tale" typeface="Microsoft Tai Le"/>
+        <a:font script="Talu" typeface="Microsoft New Tai Lue"/>
+        <a:font script="Tfng" typeface="Ebrima"/>
+      </a:minorFont>
+    </a:fontScheme>
+    <a:fmtScheme name="Office">
+      <a:fillStyleLst>
+        <a:solidFill>
+          <a:schemeClr val="phClr"/>
+        </a:solidFill>
+        <a:gradFill rotWithShape="1">
+          <a:gsLst>
+            <a:gs pos="0">
+              <a:schemeClr val="phClr">
+                <a:lumMod val="110000"/>
+                <a:satMod val="105000"/>
+                <a:tint val="67000"/>
+              </a:schemeClr>
+            </a:gs>
+            <a:gs pos="50000">
+              <a:schemeClr val="phClr">
+                <a:lumMod val="105000"/>
+                <a:satMod val="103000"/>
+                <a:tint val="73000"/>
+              </a:schemeClr>
+            </a:gs>
+            <a:gs pos="100000">
+              <a:schemeClr val="phClr">
+                <a:lumMod val="105000"/>
+                <a:satMod val="109000"/>
+                <a:tint val="81000"/>
+              </a:schemeClr>
+            </a:gs>
+          </a:gsLst>
+          <a:lin ang="5400000" scaled="0"/>
+        </a:gradFill>
+        <a:gradFill rotWithShape="1">
+          <a:gsLst>
+            <a:gs pos="0">
+              <a:schemeClr val="phClr">
+                <a:satMod val="103000"/>
+                <a:lumMod val="102000"/>
+                <a:tint val="94000"/>
+              </a:schemeClr>
+            </a:gs>
+            <a:gs pos="50000">
+              <a:schemeClr val="phClr">
+                <a:satMod val="110000"/>
+                <a:lumMod val="100000"/>
+                <a:shade val="100000"/>
+              </a:schemeClr>
+            </a:gs>
+            <a:gs pos="100000">
+              <a:schemeClr val="phClr">
+                <a:lumMod val="99000"/>
+                <a:satMod val="120000"/>
+                <a:shade val="78000"/>
+              </a:schemeClr>
+            </a:gs>
+          </a:gsLst>
+          <a:lin ang="5400000" scaled="0"/>
+        </a:gradFill>
+      </a:fillStyleLst>
+      <a:lnStyleLst>
+        <a:ln w="6350" cap="flat" cmpd="sng" algn="ctr">
+          <a:solidFill>
+            <a:schemeClr val="phClr"/>
+          </a:solidFill>
+          <a:prstDash val="solid"/>
+          <a:miter lim="800000"/>
+        </a:ln>
+        <a:ln w="12700" cap="flat" cmpd="sng" algn="ctr">
+          <a:solidFill>
+            <a:schemeClr val="phClr"/>
+          </a:solidFill>
+          <a:prstDash val="solid"/>
+          <a:miter lim="800000"/>
+        </a:ln>
+        <a:ln w="19050" cap="flat" cmpd="sng" algn="ctr">
+          <a:solidFill>
+            <a:schemeClr val="phClr"/>
+          </a:solidFill>
+          <a:prstDash val="solid"/>
+          <a:miter lim="800000"/>
+        </a:ln>
+      </a:lnStyleLst>
+      <a:effectStyleLst>
+        <a:effectStyle>
+          <a:effectLst/>
+        </a:effectStyle>
+        <a:effectStyle>
+          <a:effectLst/>
+        </a:effectStyle>
+        <a:effectStyle>
+          <a:effectLst>
+            <a:outerShdw blurRad="57150" dist="19050" dir="5400000" algn="ctr" rotWithShape="0">
+              <a:srgbClr val="000000">
+                <a:alpha val="63000"/>
+              </a:srgbClr>
+            </a:outerShdw>
+          </a:effectLst>
+        </a:effectStyle>
+      </a:effectStyleLst>
+      <a:bgFillStyleLst>
+        <a:solidFill>
+          <a:schemeClr val="phClr"/>
+        </a:solidFill>
+        <a:solidFill>
+          <a:schemeClr val="phClr">
+            <a:tint val="95000"/>
+            <a:satMod val="170000"/>
+          </a:schemeClr>
+        </a:solidFill>
+        <a:gradFill rotWithShape="1">
+          <a:gsLst>
+            <a:gs pos="0">
+              <a:schemeClr val="phClr">
+                <a:tint val="93000"/>
+                <a:satMod val="150000"/>
+                <a:shade val="98000"/>
+                <a:lumMod val="102000"/>
+              </a:schemeClr>
+            </a:gs>
+            <a:gs pos="50000">
+              <a:schemeClr val="phClr">
+                <a:tint val="98000"/>
+                <a:satMod val="130000"/>
+                <a:shade val="90000"/>
+                <a:lumMod val="103000"/>
+              </a:schemeClr>
+            </a:gs>
+            <a:gs pos="100000">
+              <a:schemeClr val="phClr">
+                <a:shade val="63000"/>
+                <a:satMod val="120000"/>
+              </a:schemeClr>
+            </a:gs>
+          </a:gsLst>
+          <a:lin ang="5400000" scaled="0"/>
+        </a:gradFill>
+      </a:bgFillStyleLst>
+    </a:fmtScheme>
+  </a:themeElements>
+  <a:objectDefaults/>
+  <a:extraClrSchemeLst/>
+  <a:extLst>
+    <a:ext uri="{05A4C25C-085E-4340-85A3-A5531E510DB2}">
+      <thm15:themeFamily xmlns:thm15="http://schemas.microsoft.com/office/thememl/2012/main" name="Office Theme" id="{62F939B6-93AF-4DB8-9C6B-D6C7DFDC589F}" vid="{4A3C46E8-61CC-4603-A589-7422A47A8E4A}"/>
+    </a:ext>
+  </a:extLst>
+</a:theme>
 </file>
</xml_diff>